<commit_message>
Changement sur le ppt
</commit_message>
<xml_diff>
--- a/Présentation Projet 6.pptx
+++ b/Présentation Projet 6.pptx
@@ -26,13 +26,13 @@
     <p:sldId id="301" r:id="rId17"/>
     <p:sldId id="304" r:id="rId18"/>
     <p:sldId id="313" r:id="rId19"/>
-    <p:sldId id="318" r:id="rId20"/>
-    <p:sldId id="314" r:id="rId21"/>
-    <p:sldId id="302" r:id="rId22"/>
-    <p:sldId id="305" r:id="rId23"/>
-    <p:sldId id="315" r:id="rId24"/>
-    <p:sldId id="316" r:id="rId25"/>
-    <p:sldId id="317" r:id="rId26"/>
+    <p:sldId id="314" r:id="rId20"/>
+    <p:sldId id="302" r:id="rId21"/>
+    <p:sldId id="305" r:id="rId22"/>
+    <p:sldId id="315" r:id="rId23"/>
+    <p:sldId id="316" r:id="rId24"/>
+    <p:sldId id="317" r:id="rId25"/>
+    <p:sldId id="321" r:id="rId26"/>
     <p:sldId id="306" r:id="rId27"/>
   </p:sldIdLst>
   <p:sldSz cx="12192000" cy="6858000"/>
@@ -1358,7 +1358,74 @@
           <a:bodyPr/>
           <a:lstStyle/>
           <a:p>
+            <a:r>
+              <a:rPr lang="fr-FR" dirty="0"/>
+              <a:t>On maintenant appliquer un algorithme de classification sur nos données ; On utilise ici </a:t>
+            </a:r>
+            <a:r>
+              <a:rPr lang="fr-FR" dirty="0" err="1"/>
+              <a:t>Kmeans</a:t>
+            </a:r>
+            <a:r>
+              <a:rPr lang="fr-FR" dirty="0"/>
+              <a:t>, dont voici le code </a:t>
+            </a:r>
+            <a:br>
+              <a:rPr lang="fr-FR" dirty="0"/>
+            </a:br>
+            <a:br>
+              <a:rPr lang="fr-FR" dirty="0"/>
+            </a:br>
+            <a:r>
+              <a:rPr lang="fr-FR" dirty="0"/>
+              <a:t>Ce qui nous donne le </a:t>
+            </a:r>
+            <a:r>
+              <a:rPr lang="fr-FR" dirty="0" err="1"/>
+              <a:t>DataFrame</a:t>
+            </a:r>
+            <a:r>
+              <a:rPr lang="fr-FR" dirty="0"/>
+              <a:t> suivant : </a:t>
+            </a:r>
+          </a:p>
+          <a:p>
+            <a:r>
+              <a:rPr lang="fr-FR" dirty="0"/>
+              <a:t>CLICK</a:t>
+            </a:r>
+          </a:p>
+          <a:p>
             <a:endParaRPr lang="fr-FR" dirty="0"/>
+          </a:p>
+          <a:p>
+            <a:r>
+              <a:rPr lang="fr-FR" dirty="0"/>
+              <a:t>On a ici un </a:t>
+            </a:r>
+            <a:r>
+              <a:rPr lang="fr-FR" dirty="0" err="1"/>
+              <a:t>df</a:t>
+            </a:r>
+            <a:r>
+              <a:rPr lang="fr-FR" dirty="0"/>
+              <a:t> avec nos valeurs d’ACP, ainsi que le Cluster auquel appartient l’individu.</a:t>
+            </a:r>
+          </a:p>
+          <a:p>
+            <a:endParaRPr lang="fr-FR" dirty="0"/>
+          </a:p>
+          <a:p>
+            <a:r>
+              <a:rPr lang="fr-FR" dirty="0"/>
+              <a:t>Ici le choix est de 2. Visualisons les données pour voir si les 2 clusters correspondent bien à Vrai/faux.</a:t>
+            </a:r>
+          </a:p>
+          <a:p>
+            <a:r>
+              <a:rPr lang="fr-FR" dirty="0"/>
+              <a:t>CLICK</a:t>
+            </a:r>
           </a:p>
         </p:txBody>
       </p:sp>
@@ -1456,6 +1523,32 @@
               <a:t>Vérifions avec le graphiques de l’ACP pour nous rendre compte</a:t>
             </a:r>
           </a:p>
+          <a:p>
+            <a:endParaRPr lang="fr-FR" dirty="0"/>
+          </a:p>
+          <a:p>
+            <a:pPr marL="0" marR="0" lvl="0" indent="0" algn="l" defTabSz="914400" rtl="0" eaLnBrk="1" fontAlgn="auto" latinLnBrk="0" hangingPunct="1">
+              <a:lnSpc>
+                <a:spcPct val="100000"/>
+              </a:lnSpc>
+              <a:spcBef>
+                <a:spcPts val="0"/>
+              </a:spcBef>
+              <a:spcAft>
+                <a:spcPts val="0"/>
+              </a:spcAft>
+              <a:buClrTx/>
+              <a:buSzTx/>
+              <a:buFontTx/>
+              <a:buNone/>
+              <a:tabLst/>
+              <a:defRPr/>
+            </a:pPr>
+            <a:r>
+              <a:rPr lang="fr-FR" dirty="0"/>
+              <a:t>Nos deux clusters rejoignent presque intégralement les valeurs vrai/faux que nous avions vu avant</a:t>
+            </a:r>
+          </a:p>
         </p:txBody>
       </p:sp>
       <p:sp>
@@ -1538,10 +1631,7 @@
           <a:bodyPr/>
           <a:lstStyle/>
           <a:p>
-            <a:r>
-              <a:rPr lang="fr-FR" dirty="0"/>
-              <a:t>Nos deux clusters rejoignent presque intégralement les valeurs vrai/faux que nous avions vu avant</a:t>
-            </a:r>
+            <a:endParaRPr lang="fr-FR" dirty="0"/>
           </a:p>
         </p:txBody>
       </p:sp>
@@ -1571,7 +1661,7 @@
     </p:spTree>
     <p:extLst>
       <p:ext uri="{BB962C8B-B14F-4D97-AF65-F5344CB8AC3E}">
-        <p14:creationId xmlns:p14="http://schemas.microsoft.com/office/powerpoint/2010/main" val="235522834"/>
+        <p14:creationId xmlns:p14="http://schemas.microsoft.com/office/powerpoint/2010/main" val="3054681355"/>
       </p:ext>
     </p:extLst>
   </p:cSld>
@@ -1625,7 +1715,10 @@
           <a:bodyPr/>
           <a:lstStyle/>
           <a:p>
-            <a:endParaRPr lang="fr-FR" dirty="0"/>
+            <a:r>
+              <a:rPr lang="fr-FR" dirty="0"/>
+              <a:t>FAIT</a:t>
+            </a:r>
           </a:p>
         </p:txBody>
       </p:sp>
@@ -1644,7 +1737,7 @@
           <a:bodyPr/>
           <a:lstStyle/>
           <a:p>
-            <a:fld id="{F44DFA25-216B-4048-9E14-17772AFFB9C9}" type="slidenum">
+            <a:fld id="{5F05756B-5F5C-4EED-907C-E25857D58D0B}" type="slidenum">
               <a:rPr lang="fr-FR" smtClean="0"/>
               <a:t>20</a:t>
             </a:fld>
@@ -1655,7 +1748,7 @@
     </p:spTree>
     <p:extLst>
       <p:ext uri="{BB962C8B-B14F-4D97-AF65-F5344CB8AC3E}">
-        <p14:creationId xmlns:p14="http://schemas.microsoft.com/office/powerpoint/2010/main" val="3054681355"/>
+        <p14:creationId xmlns:p14="http://schemas.microsoft.com/office/powerpoint/2010/main" val="359202488"/>
       </p:ext>
     </p:extLst>
   </p:cSld>
@@ -1798,8 +1891,78 @@
           <a:p>
             <a:r>
               <a:rPr lang="fr-FR" dirty="0"/>
-              <a:t>FAIT</a:t>
-            </a:r>
+              <a:t>Ici, seules les colonnes </a:t>
+            </a:r>
+            <a:r>
+              <a:rPr lang="fr-FR" dirty="0" err="1"/>
+              <a:t>margin_low</a:t>
+            </a:r>
+            <a:r>
+              <a:rPr lang="fr-FR" dirty="0"/>
+              <a:t> et up sont des paramètres significatifs pour notre régression. En effet ce sont les deux seules variables ayant une </a:t>
+            </a:r>
+            <a:r>
+              <a:rPr lang="fr-FR" dirty="0" err="1"/>
+              <a:t>p_valeur</a:t>
+            </a:r>
+            <a:r>
+              <a:rPr lang="fr-FR" dirty="0"/>
+              <a:t> inférieur à 5%.</a:t>
+            </a:r>
+          </a:p>
+          <a:p>
+            <a:endParaRPr lang="fr-FR" dirty="0"/>
+          </a:p>
+          <a:p>
+            <a:r>
+              <a:rPr lang="fr-FR" dirty="0"/>
+              <a:t>La régression logistique pour notre programme se basera donc sur les variables </a:t>
+            </a:r>
+            <a:r>
+              <a:rPr lang="fr-FR" dirty="0" err="1"/>
+              <a:t>margin_low</a:t>
+            </a:r>
+            <a:r>
+              <a:rPr lang="fr-FR" dirty="0"/>
+              <a:t> et up. </a:t>
+            </a:r>
+          </a:p>
+          <a:p>
+            <a:endParaRPr lang="fr-FR" dirty="0"/>
+          </a:p>
+          <a:p>
+            <a:r>
+              <a:rPr lang="fr-FR" dirty="0"/>
+              <a:t>POINT SUR CE QUI EST DIT PENDANT L’ACP :</a:t>
+            </a:r>
+          </a:p>
+          <a:p>
+            <a:r>
+              <a:rPr lang="fr-FR" dirty="0"/>
+              <a:t>Dans la version écrite du code, vous pourrez trouver un test effectué en utilisant PC1 et PC2 au lieu de </a:t>
+            </a:r>
+            <a:r>
+              <a:rPr lang="fr-FR" dirty="0" err="1"/>
+              <a:t>margin_low</a:t>
+            </a:r>
+            <a:r>
+              <a:rPr lang="fr-FR" dirty="0"/>
+              <a:t> et up, cependant l’</a:t>
+            </a:r>
+            <a:r>
+              <a:rPr lang="fr-FR" dirty="0" err="1"/>
+              <a:t>accuracy</a:t>
+            </a:r>
+            <a:r>
+              <a:rPr lang="fr-FR" dirty="0"/>
+              <a:t> étant inférieur (96% contre 98% pour la régression que je vous présente aujourd’hui), cette méthode n’a pas été retenue.</a:t>
+            </a:r>
+          </a:p>
+          <a:p>
+            <a:endParaRPr lang="fr-FR" dirty="0"/>
+          </a:p>
+          <a:p>
+            <a:endParaRPr lang="fr-FR" dirty="0"/>
           </a:p>
         </p:txBody>
       </p:sp>
@@ -1818,7 +1981,7 @@
           <a:bodyPr/>
           <a:lstStyle/>
           <a:p>
-            <a:fld id="{5F05756B-5F5C-4EED-907C-E25857D58D0B}" type="slidenum">
+            <a:fld id="{F44DFA25-216B-4048-9E14-17772AFFB9C9}" type="slidenum">
               <a:rPr lang="fr-FR" smtClean="0"/>
               <a:t>21</a:t>
             </a:fld>
@@ -1829,7 +1992,7 @@
     </p:spTree>
     <p:extLst>
       <p:ext uri="{BB962C8B-B14F-4D97-AF65-F5344CB8AC3E}">
-        <p14:creationId xmlns:p14="http://schemas.microsoft.com/office/powerpoint/2010/main" val="359202488"/>
+        <p14:creationId xmlns:p14="http://schemas.microsoft.com/office/powerpoint/2010/main" val="2785654452"/>
       </p:ext>
     </p:extLst>
   </p:cSld>
@@ -1885,71 +2048,92 @@
           <a:p>
             <a:r>
               <a:rPr lang="fr-FR" dirty="0"/>
-              <a:t>Ici, seules les colonnes </a:t>
+              <a:t>Le programme se compose de 3 parties : </a:t>
+            </a:r>
+          </a:p>
+          <a:p>
+            <a:endParaRPr lang="fr-FR" dirty="0"/>
+          </a:p>
+          <a:p>
+            <a:r>
+              <a:rPr lang="fr-FR" dirty="0"/>
+              <a:t>D’abord la phase de nettoyage et de vérification </a:t>
+            </a:r>
+          </a:p>
+          <a:p>
+            <a:r>
+              <a:rPr lang="fr-FR" dirty="0"/>
+              <a:t>CLICK</a:t>
+            </a:r>
+          </a:p>
+          <a:p>
+            <a:endParaRPr lang="fr-FR" dirty="0"/>
+          </a:p>
+          <a:p>
+            <a:pPr marL="0" marR="0" lvl="0" indent="0" algn="l" defTabSz="914400" rtl="0" eaLnBrk="1" fontAlgn="auto" latinLnBrk="0" hangingPunct="1">
+              <a:lnSpc>
+                <a:spcPct val="100000"/>
+              </a:lnSpc>
+              <a:spcBef>
+                <a:spcPts val="0"/>
+              </a:spcBef>
+              <a:spcAft>
+                <a:spcPts val="0"/>
+              </a:spcAft>
+              <a:buClrTx/>
+              <a:buSzTx/>
+              <a:buFontTx/>
+              <a:buNone/>
+              <a:tabLst/>
+              <a:defRPr/>
+            </a:pPr>
+            <a:r>
+              <a:rPr lang="fr-FR" dirty="0"/>
+              <a:t>CLICK</a:t>
+            </a:r>
+          </a:p>
+          <a:p>
+            <a:r>
+              <a:rPr lang="fr-FR" dirty="0"/>
+              <a:t>On commence par voir si le fichier comprend une colonne ‘ID’, qui nous sera utile par la suite </a:t>
+            </a:r>
+          </a:p>
+          <a:p>
+            <a:endParaRPr lang="fr-FR" dirty="0"/>
+          </a:p>
+          <a:p>
+            <a:r>
+              <a:rPr lang="fr-FR" dirty="0"/>
+              <a:t>CLICK</a:t>
+            </a:r>
+          </a:p>
+          <a:p>
+            <a:r>
+              <a:rPr lang="fr-FR" dirty="0"/>
+              <a:t>Ensuite, on cherche à savoir si le fichier communiqué contient bien toutes les variables indispensables à la prédiction, si ce n’est pas le cas alors un message d’erreur s’affiche. Le fichier peut contenir </a:t>
             </a:r>
             <a:r>
               <a:rPr lang="fr-FR" dirty="0" err="1"/>
-              <a:t>margin_low</a:t>
+              <a:t>pluss</a:t>
             </a:r>
             <a:r>
               <a:rPr lang="fr-FR" dirty="0"/>
-              <a:t> et up sont des paramètres significatifs pour notre régression. En effet ce sont les deux seules variables ayant une </a:t>
-            </a:r>
-            <a:r>
-              <a:rPr lang="fr-FR" dirty="0" err="1"/>
-              <a:t>p_valeur</a:t>
-            </a:r>
+              <a:t> de variables que prévues, tant que l’on a bien les variables indispensables.</a:t>
+            </a:r>
+          </a:p>
+          <a:p>
+            <a:endParaRPr lang="fr-FR" dirty="0"/>
+          </a:p>
+          <a:p>
             <a:r>
               <a:rPr lang="fr-FR" dirty="0"/>
-              <a:t> inférieur à 5%.</a:t>
-            </a:r>
-          </a:p>
-          <a:p>
-            <a:endParaRPr lang="fr-FR" dirty="0"/>
+              <a:t>CLICK</a:t>
+            </a:r>
           </a:p>
           <a:p>
             <a:r>
               <a:rPr lang="fr-FR" dirty="0"/>
-              <a:t>La régression logistique pour notre programme se basera donc sur les variables </a:t>
-            </a:r>
-            <a:r>
-              <a:rPr lang="fr-FR" dirty="0" err="1"/>
-              <a:t>margin_low</a:t>
-            </a:r>
-            <a:r>
-              <a:rPr lang="fr-FR" dirty="0"/>
-              <a:t> et up. </a:t>
-            </a:r>
-          </a:p>
-          <a:p>
-            <a:endParaRPr lang="fr-FR" dirty="0"/>
-          </a:p>
-          <a:p>
-            <a:r>
-              <a:rPr lang="fr-FR" dirty="0"/>
-              <a:t>POINT SUR CE QUI EST DIT PENDANT L’ACP :</a:t>
-            </a:r>
-          </a:p>
-          <a:p>
-            <a:r>
-              <a:rPr lang="fr-FR" dirty="0"/>
-              <a:t>Dans la version écrite du code, vous pourrez trouver un test effectué en utilisant PC1 et PC2 au lieu de </a:t>
-            </a:r>
-            <a:r>
-              <a:rPr lang="fr-FR" dirty="0" err="1"/>
-              <a:t>margin_low</a:t>
-            </a:r>
-            <a:r>
-              <a:rPr lang="fr-FR" dirty="0"/>
-              <a:t> et up, cependant l’</a:t>
-            </a:r>
-            <a:r>
-              <a:rPr lang="fr-FR" dirty="0" err="1"/>
-              <a:t>accuracy</a:t>
-            </a:r>
-            <a:r>
-              <a:rPr lang="fr-FR" dirty="0"/>
-              <a:t> étant inférieur (96% contre 98% pour la régression que je vous présente aujourd’hui), cette méthode n’a pas été retenue.</a:t>
+              <a:t>Enfin, on remplace les éventuelles valeurs manquantes.</a:t>
             </a:r>
           </a:p>
           <a:p>
@@ -1986,7 +2170,7 @@
     </p:spTree>
     <p:extLst>
       <p:ext uri="{BB962C8B-B14F-4D97-AF65-F5344CB8AC3E}">
-        <p14:creationId xmlns:p14="http://schemas.microsoft.com/office/powerpoint/2010/main" val="2785654452"/>
+        <p14:creationId xmlns:p14="http://schemas.microsoft.com/office/powerpoint/2010/main" val="1682505979"/>
       </p:ext>
     </p:extLst>
   </p:cSld>
@@ -2042,17 +2226,19 @@
           <a:p>
             <a:r>
               <a:rPr lang="fr-FR" dirty="0"/>
-              <a:t>Le programme se compose de 3 parties : </a:t>
+              <a:t>2</a:t>
+            </a:r>
+            <a:r>
+              <a:rPr lang="fr-FR" baseline="30000" dirty="0"/>
+              <a:t>ème</a:t>
+            </a:r>
+            <a:r>
+              <a:rPr lang="fr-FR" dirty="0"/>
+              <a:t> partie : La prédiction</a:t>
             </a:r>
           </a:p>
           <a:p>
             <a:endParaRPr lang="fr-FR" dirty="0"/>
-          </a:p>
-          <a:p>
-            <a:r>
-              <a:rPr lang="fr-FR" dirty="0"/>
-              <a:t>D’abord la phase de nettoyage et de vérification </a:t>
-            </a:r>
           </a:p>
           <a:p>
             <a:r>
@@ -2061,26 +2247,39 @@
             </a:r>
           </a:p>
           <a:p>
+            <a:r>
+              <a:rPr lang="fr-FR" dirty="0"/>
+              <a:t>On commence par appliquer la fonction .</a:t>
+            </a:r>
+            <a:r>
+              <a:rPr lang="fr-FR" dirty="0" err="1"/>
+              <a:t>predict</a:t>
+            </a:r>
+            <a:r>
+              <a:rPr lang="fr-FR" dirty="0"/>
+              <a:t> à notre </a:t>
+            </a:r>
+            <a:r>
+              <a:rPr lang="fr-FR" dirty="0" err="1"/>
+              <a:t>df</a:t>
+            </a:r>
+            <a:r>
+              <a:rPr lang="fr-FR" dirty="0"/>
+              <a:t>, selon la régression logistique que l’on a vu </a:t>
+            </a:r>
+            <a:r>
+              <a:rPr lang="fr-FR" dirty="0" err="1"/>
+              <a:t>précédement</a:t>
+            </a:r>
+            <a:r>
+              <a:rPr lang="fr-FR" dirty="0"/>
+              <a:t>.</a:t>
+            </a:r>
+          </a:p>
+          <a:p>
             <a:endParaRPr lang="fr-FR" dirty="0"/>
           </a:p>
           <a:p>
-            <a:pPr marL="0" marR="0" lvl="0" indent="0" algn="l" defTabSz="914400" rtl="0" eaLnBrk="1" fontAlgn="auto" latinLnBrk="0" hangingPunct="1">
-              <a:lnSpc>
-                <a:spcPct val="100000"/>
-              </a:lnSpc>
-              <a:spcBef>
-                <a:spcPts val="0"/>
-              </a:spcBef>
-              <a:spcAft>
-                <a:spcPts val="0"/>
-              </a:spcAft>
-              <a:buClrTx/>
-              <a:buSzTx/>
-              <a:buFontTx/>
-              <a:buNone/>
-              <a:tabLst/>
-              <a:defRPr/>
-            </a:pPr>
             <a:r>
               <a:rPr lang="fr-FR" dirty="0"/>
               <a:t>CLICK</a:t>
@@ -2089,7 +2288,23 @@
           <a:p>
             <a:r>
               <a:rPr lang="fr-FR" dirty="0"/>
-              <a:t>On commence par voir si le fichier comprend une colonne ‘ID’, qui nous sera utile par la suite </a:t>
+              <a:t>On récupère ensuite les données et on manipule le </a:t>
+            </a:r>
+            <a:r>
+              <a:rPr lang="fr-FR" dirty="0" err="1"/>
+              <a:t>df</a:t>
+            </a:r>
+            <a:r>
+              <a:rPr lang="fr-FR" dirty="0"/>
+              <a:t> afin d’avoir un rendu comprenant : Une colonne ‘ID’, une colonne ‘PROBA’, une colonne ‘</a:t>
+            </a:r>
+            <a:r>
+              <a:rPr lang="fr-FR" dirty="0" err="1"/>
+              <a:t>is_genuine</a:t>
+            </a:r>
+            <a:r>
+              <a:rPr lang="fr-FR" dirty="0"/>
+              <a:t>’ </a:t>
             </a:r>
           </a:p>
           <a:p>
@@ -2104,37 +2319,8 @@
           <a:p>
             <a:r>
               <a:rPr lang="fr-FR" dirty="0"/>
-              <a:t>Ensuite, on cherche à savoir si le fichier communiqué contient bien toutes les variables indispensables à la prédiction, si ce n’est pas le cas alors un message d’erreur s’affiche. Le fichier peut contenir </a:t>
-            </a:r>
-            <a:r>
-              <a:rPr lang="fr-FR" dirty="0" err="1"/>
-              <a:t>pluss</a:t>
-            </a:r>
-            <a:r>
-              <a:rPr lang="fr-FR" dirty="0"/>
-              <a:t> de variables que prévues, tant que l’on a bien les variables indispensables.</a:t>
-            </a:r>
-          </a:p>
-          <a:p>
-            <a:endParaRPr lang="fr-FR" dirty="0"/>
-          </a:p>
-          <a:p>
-            <a:r>
-              <a:rPr lang="fr-FR" dirty="0"/>
-              <a:t>CLICK</a:t>
-            </a:r>
-          </a:p>
-          <a:p>
-            <a:r>
-              <a:rPr lang="fr-FR" dirty="0"/>
-              <a:t>Enfin, on remplace les éventuelles valeurs manquantes.</a:t>
-            </a:r>
-          </a:p>
-          <a:p>
-            <a:endParaRPr lang="fr-FR" dirty="0"/>
-          </a:p>
-          <a:p>
-            <a:endParaRPr lang="fr-FR" dirty="0"/>
+              <a:t>On enregistre ensuite le fichier en .csv</a:t>
+            </a:r>
           </a:p>
         </p:txBody>
       </p:sp>
@@ -2164,7 +2350,7 @@
     </p:spTree>
     <p:extLst>
       <p:ext uri="{BB962C8B-B14F-4D97-AF65-F5344CB8AC3E}">
-        <p14:creationId xmlns:p14="http://schemas.microsoft.com/office/powerpoint/2010/main" val="1682505979"/>
+        <p14:creationId xmlns:p14="http://schemas.microsoft.com/office/powerpoint/2010/main" val="640740844"/>
       </p:ext>
     </p:extLst>
   </p:cSld>
@@ -2220,7 +2406,7 @@
           <a:p>
             <a:r>
               <a:rPr lang="fr-FR" dirty="0"/>
-              <a:t>2</a:t>
+              <a:t>3</a:t>
             </a:r>
             <a:r>
               <a:rPr lang="fr-FR" baseline="30000" dirty="0"/>
@@ -2228,7 +2414,7 @@
             </a:r>
             <a:r>
               <a:rPr lang="fr-FR" dirty="0"/>
-              <a:t> partie : La prédiction</a:t>
+              <a:t> partie : Calcul du nombre de Vrais/Faux</a:t>
             </a:r>
           </a:p>
           <a:p>
@@ -2243,31 +2429,7 @@
           <a:p>
             <a:r>
               <a:rPr lang="fr-FR" dirty="0"/>
-              <a:t>On commence par appliquer la fonction .</a:t>
-            </a:r>
-            <a:r>
-              <a:rPr lang="fr-FR" dirty="0" err="1"/>
-              <a:t>predict</a:t>
-            </a:r>
-            <a:r>
-              <a:rPr lang="fr-FR" dirty="0"/>
-              <a:t> à notre </a:t>
-            </a:r>
-            <a:r>
-              <a:rPr lang="fr-FR" dirty="0" err="1"/>
-              <a:t>df</a:t>
-            </a:r>
-            <a:r>
-              <a:rPr lang="fr-FR" dirty="0"/>
-              <a:t>, selon la régression logistique que l’on a vu </a:t>
-            </a:r>
-            <a:r>
-              <a:rPr lang="fr-FR" dirty="0" err="1"/>
-              <a:t>précédement</a:t>
-            </a:r>
-            <a:r>
-              <a:rPr lang="fr-FR" dirty="0"/>
-              <a:t>.</a:t>
+              <a:t>On commence par calculer le nombre de vrais et de faux </a:t>
             </a:r>
           </a:p>
           <a:p>
@@ -2282,23 +2444,15 @@
           <a:p>
             <a:r>
               <a:rPr lang="fr-FR" dirty="0"/>
-              <a:t>On récupère ensuite les données et on manipule le </a:t>
+              <a:t>On </a:t>
             </a:r>
             <a:r>
               <a:rPr lang="fr-FR" dirty="0" err="1"/>
-              <a:t>df</a:t>
+              <a:t>print</a:t>
             </a:r>
             <a:r>
               <a:rPr lang="fr-FR" dirty="0"/>
-              <a:t> afin d’avoir un rendu comprenant : Une colonne ‘ID’, une colonne ‘PROBA’, une colonne ‘</a:t>
-            </a:r>
-            <a:r>
-              <a:rPr lang="fr-FR" dirty="0" err="1"/>
-              <a:t>is_genuine</a:t>
-            </a:r>
-            <a:r>
-              <a:rPr lang="fr-FR" dirty="0"/>
-              <a:t>’ </a:t>
+              <a:t> le tout pour que l’utilisateur puisse le voir</a:t>
             </a:r>
           </a:p>
           <a:p>
@@ -2313,8 +2467,34 @@
           <a:p>
             <a:r>
               <a:rPr lang="fr-FR" dirty="0"/>
-              <a:t>On enregistre ensuite le fichier en .csv</a:t>
-            </a:r>
+              <a:t>On sauvegarde les fichiers</a:t>
+            </a:r>
+          </a:p>
+          <a:p>
+            <a:endParaRPr lang="fr-FR" dirty="0"/>
+          </a:p>
+          <a:p>
+            <a:r>
+              <a:rPr lang="fr-FR" dirty="0"/>
+              <a:t>CLICK</a:t>
+            </a:r>
+          </a:p>
+          <a:p>
+            <a:r>
+              <a:rPr lang="fr-FR" dirty="0"/>
+              <a:t>Enfin on utilise return pour que le </a:t>
+            </a:r>
+            <a:r>
+              <a:rPr lang="fr-FR" dirty="0" err="1"/>
+              <a:t>Df_predict</a:t>
+            </a:r>
+            <a:r>
+              <a:rPr lang="fr-FR" dirty="0"/>
+              <a:t> s’affiche lorsque le programme est lancé.</a:t>
+            </a:r>
+          </a:p>
+          <a:p>
+            <a:endParaRPr lang="fr-FR" dirty="0"/>
           </a:p>
         </p:txBody>
       </p:sp>
@@ -2344,7 +2524,7 @@
     </p:spTree>
     <p:extLst>
       <p:ext uri="{BB962C8B-B14F-4D97-AF65-F5344CB8AC3E}">
-        <p14:creationId xmlns:p14="http://schemas.microsoft.com/office/powerpoint/2010/main" val="640740844"/>
+        <p14:creationId xmlns:p14="http://schemas.microsoft.com/office/powerpoint/2010/main" val="2861248907"/>
       </p:ext>
     </p:extLst>
   </p:cSld>
@@ -2400,95 +2580,16 @@
           <a:p>
             <a:r>
               <a:rPr lang="fr-FR" dirty="0"/>
-              <a:t>3</a:t>
-            </a:r>
-            <a:r>
-              <a:rPr lang="fr-FR" baseline="30000" dirty="0"/>
-              <a:t>ème</a:t>
+              <a:t>L’</a:t>
+            </a:r>
+            <a:r>
+              <a:rPr lang="fr-FR" dirty="0" err="1"/>
+              <a:t>accuracy</a:t>
             </a:r>
             <a:r>
               <a:rPr lang="fr-FR" dirty="0"/>
-              <a:t> partie : Calcul du nombre de Vrais/Faux</a:t>
-            </a:r>
-          </a:p>
-          <a:p>
-            <a:endParaRPr lang="fr-FR" dirty="0"/>
-          </a:p>
-          <a:p>
-            <a:r>
-              <a:rPr lang="fr-FR" dirty="0"/>
-              <a:t>CLICK</a:t>
-            </a:r>
-          </a:p>
-          <a:p>
-            <a:r>
-              <a:rPr lang="fr-FR" dirty="0"/>
-              <a:t>On commence par calculer le nombre de vrais et de faux </a:t>
-            </a:r>
-          </a:p>
-          <a:p>
-            <a:endParaRPr lang="fr-FR" dirty="0"/>
-          </a:p>
-          <a:p>
-            <a:r>
-              <a:rPr lang="fr-FR" dirty="0"/>
-              <a:t>CLICK</a:t>
-            </a:r>
-          </a:p>
-          <a:p>
-            <a:r>
-              <a:rPr lang="fr-FR" dirty="0"/>
-              <a:t>On </a:t>
-            </a:r>
-            <a:r>
-              <a:rPr lang="fr-FR" dirty="0" err="1"/>
-              <a:t>print</a:t>
-            </a:r>
-            <a:r>
-              <a:rPr lang="fr-FR" dirty="0"/>
-              <a:t> le tout pour que l’utilisateur puisse le voir</a:t>
-            </a:r>
-          </a:p>
-          <a:p>
-            <a:endParaRPr lang="fr-FR" dirty="0"/>
-          </a:p>
-          <a:p>
-            <a:r>
-              <a:rPr lang="fr-FR" dirty="0"/>
-              <a:t>CLICK</a:t>
-            </a:r>
-          </a:p>
-          <a:p>
-            <a:r>
-              <a:rPr lang="fr-FR" dirty="0"/>
-              <a:t>On sauvegarde les fichiers</a:t>
-            </a:r>
-          </a:p>
-          <a:p>
-            <a:endParaRPr lang="fr-FR" dirty="0"/>
-          </a:p>
-          <a:p>
-            <a:r>
-              <a:rPr lang="fr-FR" dirty="0"/>
-              <a:t>CLICK</a:t>
-            </a:r>
-          </a:p>
-          <a:p>
-            <a:r>
-              <a:rPr lang="fr-FR" dirty="0"/>
-              <a:t>Enfin on utilise return pour que le </a:t>
-            </a:r>
-            <a:r>
-              <a:rPr lang="fr-FR" dirty="0" err="1"/>
-              <a:t>Df_predict</a:t>
-            </a:r>
-            <a:r>
-              <a:rPr lang="fr-FR" dirty="0"/>
-              <a:t> s’affiche lorsque le programme est lancé.</a:t>
-            </a:r>
-          </a:p>
-          <a:p>
-            <a:endParaRPr lang="fr-FR" dirty="0"/>
+              <a:t> est de 98%</a:t>
+            </a:r>
           </a:p>
         </p:txBody>
       </p:sp>
@@ -2507,7 +2608,7 @@
           <a:bodyPr/>
           <a:lstStyle/>
           <a:p>
-            <a:fld id="{F44DFA25-216B-4048-9E14-17772AFFB9C9}" type="slidenum">
+            <a:fld id="{B368AEA7-4DA3-4D8F-B17B-89D4A8C69F51}" type="slidenum">
               <a:rPr lang="fr-FR" smtClean="0"/>
               <a:t>25</a:t>
             </a:fld>
@@ -2518,7 +2619,7 @@
     </p:spTree>
     <p:extLst>
       <p:ext uri="{BB962C8B-B14F-4D97-AF65-F5344CB8AC3E}">
-        <p14:creationId xmlns:p14="http://schemas.microsoft.com/office/powerpoint/2010/main" val="2861248907"/>
+        <p14:creationId xmlns:p14="http://schemas.microsoft.com/office/powerpoint/2010/main" val="1756727736"/>
       </p:ext>
     </p:extLst>
   </p:cSld>
@@ -2854,7 +2955,7 @@
             </a:r>
             <a:r>
               <a:rPr lang="fr-FR" dirty="0"/>
-              <a:t>" se démarquent dans leur écart type </a:t>
+              <a:t>" se démarquent dans leur écart type et leur moyenne</a:t>
             </a:r>
           </a:p>
           <a:p>
@@ -7119,6 +7220,41 @@
           </a:prstGeom>
         </p:spPr>
       </p:pic>
+      <p:sp>
+        <p:nvSpPr>
+          <p:cNvPr id="5" name="Titre 1">
+            <a:extLst>
+              <a:ext uri="{FF2B5EF4-FFF2-40B4-BE49-F238E27FC236}">
+                <a16:creationId xmlns:a16="http://schemas.microsoft.com/office/drawing/2014/main" id="{745EC380-8AD4-4F89-B1EE-DD2F41B1864D}"/>
+              </a:ext>
+            </a:extLst>
+          </p:cNvPr>
+          <p:cNvSpPr>
+            <a:spLocks noGrp="1"/>
+          </p:cNvSpPr>
+          <p:nvPr>
+            <p:ph type="ctrTitle"/>
+          </p:nvPr>
+        </p:nvSpPr>
+        <p:spPr>
+          <a:xfrm>
+            <a:off x="1391920" y="396240"/>
+            <a:ext cx="9408160" cy="1046481"/>
+          </a:xfrm>
+        </p:spPr>
+        <p:txBody>
+          <a:bodyPr>
+            <a:normAutofit/>
+          </a:bodyPr>
+          <a:lstStyle/>
+          <a:p>
+            <a:r>
+              <a:rPr lang="fr-FR" dirty="0"/>
+              <a:t>Relations linéaires</a:t>
+            </a:r>
+          </a:p>
+        </p:txBody>
+      </p:sp>
     </p:spTree>
     <p:extLst>
       <p:ext uri="{BB962C8B-B14F-4D97-AF65-F5344CB8AC3E}">
@@ -8876,16 +9012,24 @@
         </p:nvSpPr>
         <p:spPr>
           <a:xfrm>
-            <a:off x="1391920" y="396240"/>
-            <a:ext cx="9408160" cy="1046481"/>
+            <a:off x="762000" y="396240"/>
+            <a:ext cx="10668000" cy="1046481"/>
           </a:xfrm>
         </p:spPr>
         <p:txBody>
           <a:bodyPr>
-            <a:normAutofit/>
+            <a:normAutofit fontScale="90000"/>
           </a:bodyPr>
           <a:lstStyle/>
           <a:p>
+            <a:r>
+              <a:rPr lang="fr-FR" dirty="0"/>
+              <a:t>Algorithme de Classification - </a:t>
+            </a:r>
+            <a:r>
+              <a:rPr lang="fr-FR" dirty="0" err="1"/>
+              <a:t>Kmeans</a:t>
+            </a:r>
             <a:endParaRPr lang="fr-FR" dirty="0"/>
           </a:p>
         </p:txBody>
@@ -8948,7 +9092,7 @@
         </p:blipFill>
         <p:spPr>
           <a:xfrm>
-            <a:off x="762000" y="2971800"/>
+            <a:off x="762000" y="2118360"/>
             <a:ext cx="10668000" cy="914400"/>
           </a:xfrm>
           <a:prstGeom prst="rect">
@@ -8978,7 +9122,7 @@
         </p:blipFill>
         <p:spPr>
           <a:xfrm>
-            <a:off x="2238375" y="4216400"/>
+            <a:off x="2238375" y="3708400"/>
             <a:ext cx="7715250" cy="2438400"/>
           </a:xfrm>
           <a:prstGeom prst="rect">
@@ -8996,6 +9140,81 @@
   <p:clrMapOvr>
     <a:masterClrMapping/>
   </p:clrMapOvr>
+  <p:timing>
+    <p:tnLst>
+      <p:par>
+        <p:cTn id="1" dur="indefinite" restart="never" nodeType="tmRoot">
+          <p:childTnLst>
+            <p:seq concurrent="1" nextAc="seek">
+              <p:cTn id="2" dur="indefinite" nodeType="mainSeq">
+                <p:childTnLst>
+                  <p:par>
+                    <p:cTn id="3" fill="hold">
+                      <p:stCondLst>
+                        <p:cond delay="indefinite"/>
+                      </p:stCondLst>
+                      <p:childTnLst>
+                        <p:par>
+                          <p:cTn id="4" fill="hold">
+                            <p:stCondLst>
+                              <p:cond delay="0"/>
+                            </p:stCondLst>
+                            <p:childTnLst>
+                              <p:par>
+                                <p:cTn id="5" presetID="1" presetClass="entr" presetSubtype="0" fill="hold" nodeType="clickEffect">
+                                  <p:stCondLst>
+                                    <p:cond delay="0"/>
+                                  </p:stCondLst>
+                                  <p:childTnLst>
+                                    <p:set>
+                                      <p:cBhvr>
+                                        <p:cTn id="6" dur="1" fill="hold">
+                                          <p:stCondLst>
+                                            <p:cond delay="0"/>
+                                          </p:stCondLst>
+                                        </p:cTn>
+                                        <p:tgtEl>
+                                          <p:spTgt spid="6"/>
+                                        </p:tgtEl>
+                                        <p:attrNameLst>
+                                          <p:attrName>style.visibility</p:attrName>
+                                        </p:attrNameLst>
+                                      </p:cBhvr>
+                                      <p:to>
+                                        <p:strVal val="visible"/>
+                                      </p:to>
+                                    </p:set>
+                                  </p:childTnLst>
+                                </p:cTn>
+                              </p:par>
+                            </p:childTnLst>
+                          </p:cTn>
+                        </p:par>
+                      </p:childTnLst>
+                    </p:cTn>
+                  </p:par>
+                </p:childTnLst>
+              </p:cTn>
+              <p:prevCondLst>
+                <p:cond evt="onPrev" delay="0">
+                  <p:tgtEl>
+                    <p:sldTgt/>
+                  </p:tgtEl>
+                </p:cond>
+              </p:prevCondLst>
+              <p:nextCondLst>
+                <p:cond evt="onNext" delay="0">
+                  <p:tgtEl>
+                    <p:sldTgt/>
+                  </p:tgtEl>
+                </p:cond>
+              </p:nextCondLst>
+            </p:seq>
+          </p:childTnLst>
+        </p:cTn>
+      </p:par>
+    </p:tnLst>
+  </p:timing>
 </p:sld>
 </file>
 
@@ -9016,6 +9235,41 @@
           <a:chExt cx="0" cy="0"/>
         </a:xfrm>
       </p:grpSpPr>
+      <p:pic>
+        <p:nvPicPr>
+          <p:cNvPr id="6" name="Image 5">
+            <a:extLst>
+              <a:ext uri="{FF2B5EF4-FFF2-40B4-BE49-F238E27FC236}">
+                <a16:creationId xmlns:a16="http://schemas.microsoft.com/office/drawing/2014/main" id="{77F6596F-12B4-4FC6-A0AF-AFEEDE3B7A7D}"/>
+              </a:ext>
+            </a:extLst>
+          </p:cNvPr>
+          <p:cNvPicPr>
+            <a:picLocks noChangeAspect="1"/>
+          </p:cNvPicPr>
+          <p:nvPr/>
+        </p:nvPicPr>
+        <p:blipFill rotWithShape="1">
+          <a:blip r:embed="rId3">
+            <a:extLst>
+              <a:ext uri="{28A0092B-C50C-407E-A947-70E740481C1C}">
+                <a14:useLocalDpi xmlns:a14="http://schemas.microsoft.com/office/drawing/2010/main" val="0"/>
+              </a:ext>
+            </a:extLst>
+          </a:blip>
+          <a:srcRect l="3961" t="6828" r="9046" b="4556"/>
+          <a:stretch/>
+        </p:blipFill>
+        <p:spPr>
+          <a:xfrm>
+            <a:off x="6721841" y="1442721"/>
+            <a:ext cx="4758959" cy="4155209"/>
+          </a:xfrm>
+          <a:prstGeom prst="rect">
+            <a:avLst/>
+          </a:prstGeom>
+        </p:spPr>
+      </p:pic>
       <p:sp>
         <p:nvSpPr>
           <p:cNvPr id="2" name="Titre 1">
@@ -9066,7 +9320,7 @@
           <p:nvPr/>
         </p:nvPicPr>
         <p:blipFill>
-          <a:blip r:embed="rId3">
+          <a:blip r:embed="rId4">
             <a:extLst>
               <a:ext uri="{28A0092B-C50C-407E-A947-70E740481C1C}">
                 <a14:useLocalDpi xmlns:a14="http://schemas.microsoft.com/office/drawing/2010/main" val="0"/>
@@ -9102,7 +9356,7 @@
           <p:nvPr/>
         </p:nvPicPr>
         <p:blipFill rotWithShape="1">
-          <a:blip r:embed="rId4">
+          <a:blip r:embed="rId5">
             <a:extLst>
               <a:ext uri="{28A0092B-C50C-407E-A947-70E740481C1C}">
                 <a14:useLocalDpi xmlns:a14="http://schemas.microsoft.com/office/drawing/2010/main" val="0"/>
@@ -9114,14 +9368,97 @@
         </p:blipFill>
         <p:spPr>
           <a:xfrm>
-            <a:off x="2933203" y="1433943"/>
-            <a:ext cx="5830786" cy="5027817"/>
+            <a:off x="3714173" y="1490289"/>
+            <a:ext cx="4763653" cy="4107641"/>
           </a:xfrm>
           <a:prstGeom prst="rect">
             <a:avLst/>
           </a:prstGeom>
         </p:spPr>
       </p:pic>
+      <p:sp>
+        <p:nvSpPr>
+          <p:cNvPr id="9" name="ZoneTexte 8">
+            <a:extLst>
+              <a:ext uri="{FF2B5EF4-FFF2-40B4-BE49-F238E27FC236}">
+                <a16:creationId xmlns:a16="http://schemas.microsoft.com/office/drawing/2014/main" id="{6C45B59F-8298-4C85-B8D1-3FABEE6CCB94}"/>
+              </a:ext>
+            </a:extLst>
+          </p:cNvPr>
+          <p:cNvSpPr txBox="1"/>
+          <p:nvPr/>
+        </p:nvSpPr>
+        <p:spPr>
+          <a:xfrm>
+            <a:off x="2491876" y="1120957"/>
+            <a:ext cx="1107996" cy="369332"/>
+          </a:xfrm>
+          <a:prstGeom prst="rect">
+            <a:avLst/>
+          </a:prstGeom>
+          <a:noFill/>
+        </p:spPr>
+        <p:txBody>
+          <a:bodyPr wrap="none" rtlCol="0">
+            <a:spAutoFit/>
+          </a:bodyPr>
+          <a:lstStyle/>
+          <a:p>
+            <a:r>
+              <a:rPr lang="fr-FR" altLang="fr-FR" dirty="0">
+                <a:latin typeface="Arial Unicode MS"/>
+              </a:rPr>
+              <a:t>K-</a:t>
+            </a:r>
+            <a:r>
+              <a:rPr lang="fr-FR" altLang="fr-FR" dirty="0" err="1">
+                <a:latin typeface="Arial Unicode MS"/>
+              </a:rPr>
+              <a:t>means</a:t>
+            </a:r>
+            <a:endParaRPr lang="fr-FR" altLang="fr-FR" dirty="0">
+              <a:latin typeface="Arial Unicode MS"/>
+            </a:endParaRPr>
+          </a:p>
+        </p:txBody>
+      </p:sp>
+      <p:sp>
+        <p:nvSpPr>
+          <p:cNvPr id="10" name="ZoneTexte 9">
+            <a:extLst>
+              <a:ext uri="{FF2B5EF4-FFF2-40B4-BE49-F238E27FC236}">
+                <a16:creationId xmlns:a16="http://schemas.microsoft.com/office/drawing/2014/main" id="{67C619D1-9D0A-4E6E-8B64-D3FEE19C9A63}"/>
+              </a:ext>
+            </a:extLst>
+          </p:cNvPr>
+          <p:cNvSpPr txBox="1"/>
+          <p:nvPr/>
+        </p:nvSpPr>
+        <p:spPr>
+          <a:xfrm>
+            <a:off x="8990580" y="1120957"/>
+            <a:ext cx="659155" cy="369332"/>
+          </a:xfrm>
+          <a:prstGeom prst="rect">
+            <a:avLst/>
+          </a:prstGeom>
+          <a:noFill/>
+        </p:spPr>
+        <p:txBody>
+          <a:bodyPr wrap="none" rtlCol="0">
+            <a:spAutoFit/>
+          </a:bodyPr>
+          <a:lstStyle/>
+          <a:p>
+            <a:r>
+              <a:rPr lang="fr-FR" altLang="fr-FR" dirty="0">
+                <a:latin typeface="Arial Unicode MS"/>
+              </a:rPr>
+              <a:t>ACP</a:t>
+            </a:r>
+          </a:p>
+        </p:txBody>
+      </p:sp>
     </p:spTree>
     <p:extLst>
       <p:ext uri="{BB962C8B-B14F-4D97-AF65-F5344CB8AC3E}">
@@ -9132,6 +9469,207 @@
   <p:clrMapOvr>
     <a:masterClrMapping/>
   </p:clrMapOvr>
+  <p:timing>
+    <p:tnLst>
+      <p:par>
+        <p:cTn id="1" dur="indefinite" restart="never" nodeType="tmRoot">
+          <p:childTnLst>
+            <p:seq concurrent="1" nextAc="seek">
+              <p:cTn id="2" dur="indefinite" nodeType="mainSeq">
+                <p:childTnLst>
+                  <p:par>
+                    <p:cTn id="3" fill="hold">
+                      <p:stCondLst>
+                        <p:cond delay="indefinite"/>
+                      </p:stCondLst>
+                      <p:childTnLst>
+                        <p:par>
+                          <p:cTn id="4" fill="hold">
+                            <p:stCondLst>
+                              <p:cond delay="0"/>
+                            </p:stCondLst>
+                            <p:childTnLst>
+                              <p:par>
+                                <p:cTn id="5" presetID="1" presetClass="exit" presetSubtype="0" fill="hold" grpId="0" nodeType="clickEffect">
+                                  <p:stCondLst>
+                                    <p:cond delay="0"/>
+                                  </p:stCondLst>
+                                  <p:childTnLst>
+                                    <p:set>
+                                      <p:cBhvr>
+                                        <p:cTn id="6" dur="1" fill="hold">
+                                          <p:stCondLst>
+                                            <p:cond delay="0"/>
+                                          </p:stCondLst>
+                                        </p:cTn>
+                                        <p:tgtEl>
+                                          <p:spTgt spid="2"/>
+                                        </p:tgtEl>
+                                        <p:attrNameLst>
+                                          <p:attrName>style.visibility</p:attrName>
+                                        </p:attrNameLst>
+                                      </p:cBhvr>
+                                      <p:to>
+                                        <p:strVal val="hidden"/>
+                                      </p:to>
+                                    </p:set>
+                                  </p:childTnLst>
+                                </p:cTn>
+                              </p:par>
+                              <p:par>
+                                <p:cTn id="7" presetID="42" presetClass="path" presetSubtype="0" accel="50000" decel="50000" fill="hold" nodeType="withEffect">
+                                  <p:stCondLst>
+                                    <p:cond delay="0"/>
+                                  </p:stCondLst>
+                                  <p:childTnLst>
+                                    <p:animMotion origin="layout" path="M 4.16667E-7 3.7037E-6 L -0.2724 3.7037E-6 " pathEditMode="relative" rAng="0" ptsTypes="AA">
+                                      <p:cBhvr>
+                                        <p:cTn id="8" dur="2000" fill="hold"/>
+                                        <p:tgtEl>
+                                          <p:spTgt spid="7"/>
+                                        </p:tgtEl>
+                                        <p:attrNameLst>
+                                          <p:attrName>ppt_x</p:attrName>
+                                          <p:attrName>ppt_y</p:attrName>
+                                        </p:attrNameLst>
+                                      </p:cBhvr>
+                                      <p:rCtr x="-13620" y="0"/>
+                                    </p:animMotion>
+                                  </p:childTnLst>
+                                </p:cTn>
+                              </p:par>
+                            </p:childTnLst>
+                          </p:cTn>
+                        </p:par>
+                        <p:par>
+                          <p:cTn id="9" fill="hold">
+                            <p:stCondLst>
+                              <p:cond delay="2000"/>
+                            </p:stCondLst>
+                            <p:childTnLst>
+                              <p:par>
+                                <p:cTn id="10" presetID="1" presetClass="entr" presetSubtype="0" fill="hold" nodeType="afterEffect">
+                                  <p:stCondLst>
+                                    <p:cond delay="0"/>
+                                  </p:stCondLst>
+                                  <p:childTnLst>
+                                    <p:set>
+                                      <p:cBhvr>
+                                        <p:cTn id="11" dur="1" fill="hold">
+                                          <p:stCondLst>
+                                            <p:cond delay="0"/>
+                                          </p:stCondLst>
+                                        </p:cTn>
+                                        <p:tgtEl>
+                                          <p:spTgt spid="6"/>
+                                        </p:tgtEl>
+                                        <p:attrNameLst>
+                                          <p:attrName>style.visibility</p:attrName>
+                                        </p:attrNameLst>
+                                      </p:cBhvr>
+                                      <p:to>
+                                        <p:strVal val="visible"/>
+                                      </p:to>
+                                    </p:set>
+                                  </p:childTnLst>
+                                </p:cTn>
+                              </p:par>
+                            </p:childTnLst>
+                          </p:cTn>
+                        </p:par>
+                        <p:par>
+                          <p:cTn id="12" fill="hold">
+                            <p:stCondLst>
+                              <p:cond delay="2000"/>
+                            </p:stCondLst>
+                            <p:childTnLst>
+                              <p:par>
+                                <p:cTn id="13" presetID="1" presetClass="entr" presetSubtype="0" fill="hold" grpId="0" nodeType="afterEffect">
+                                  <p:stCondLst>
+                                    <p:cond delay="1000"/>
+                                  </p:stCondLst>
+                                  <p:childTnLst>
+                                    <p:set>
+                                      <p:cBhvr>
+                                        <p:cTn id="14" dur="1" fill="hold">
+                                          <p:stCondLst>
+                                            <p:cond delay="0"/>
+                                          </p:stCondLst>
+                                        </p:cTn>
+                                        <p:tgtEl>
+                                          <p:spTgt spid="9"/>
+                                        </p:tgtEl>
+                                        <p:attrNameLst>
+                                          <p:attrName>style.visibility</p:attrName>
+                                        </p:attrNameLst>
+                                      </p:cBhvr>
+                                      <p:to>
+                                        <p:strVal val="visible"/>
+                                      </p:to>
+                                    </p:set>
+                                  </p:childTnLst>
+                                </p:cTn>
+                              </p:par>
+                              <p:par>
+                                <p:cTn id="15" presetID="1" presetClass="entr" presetSubtype="0" fill="hold" grpId="0" nodeType="withEffect">
+                                  <p:stCondLst>
+                                    <p:cond delay="1000"/>
+                                  </p:stCondLst>
+                                  <p:childTnLst>
+                                    <p:set>
+                                      <p:cBhvr>
+                                        <p:cTn id="16" dur="1" fill="hold">
+                                          <p:stCondLst>
+                                            <p:cond delay="0"/>
+                                          </p:stCondLst>
+                                        </p:cTn>
+                                        <p:tgtEl>
+                                          <p:spTgt spid="10"/>
+                                        </p:tgtEl>
+                                        <p:attrNameLst>
+                                          <p:attrName>style.visibility</p:attrName>
+                                        </p:attrNameLst>
+                                      </p:cBhvr>
+                                      <p:to>
+                                        <p:strVal val="visible"/>
+                                      </p:to>
+                                    </p:set>
+                                  </p:childTnLst>
+                                </p:cTn>
+                              </p:par>
+                            </p:childTnLst>
+                          </p:cTn>
+                        </p:par>
+                      </p:childTnLst>
+                    </p:cTn>
+                  </p:par>
+                </p:childTnLst>
+              </p:cTn>
+              <p:prevCondLst>
+                <p:cond evt="onPrev" delay="0">
+                  <p:tgtEl>
+                    <p:sldTgt/>
+                  </p:tgtEl>
+                </p:cond>
+              </p:prevCondLst>
+              <p:nextCondLst>
+                <p:cond evt="onNext" delay="0">
+                  <p:tgtEl>
+                    <p:sldTgt/>
+                  </p:tgtEl>
+                </p:cond>
+              </p:nextCondLst>
+            </p:seq>
+          </p:childTnLst>
+        </p:cTn>
+      </p:par>
+    </p:tnLst>
+    <p:bldLst>
+      <p:bldP spid="2" grpId="0"/>
+      <p:bldP spid="9" grpId="0"/>
+      <p:bldP spid="10" grpId="0"/>
+    </p:bldLst>
+  </p:timing>
 </p:sld>
 </file>
 
@@ -9152,76 +9690,41 @@
           <a:chExt cx="0" cy="0"/>
         </a:xfrm>
       </p:grpSpPr>
-      <p:pic>
-        <p:nvPicPr>
-          <p:cNvPr id="7" name="Image 6">
-            <a:extLst>
-              <a:ext uri="{FF2B5EF4-FFF2-40B4-BE49-F238E27FC236}">
-                <a16:creationId xmlns:a16="http://schemas.microsoft.com/office/drawing/2014/main" id="{9A179E91-6D19-4C15-B175-2A857BDA6B42}"/>
-              </a:ext>
-            </a:extLst>
-          </p:cNvPr>
-          <p:cNvPicPr>
-            <a:picLocks noChangeAspect="1"/>
-          </p:cNvPicPr>
-          <p:nvPr/>
-        </p:nvPicPr>
-        <p:blipFill rotWithShape="1">
-          <a:blip r:embed="rId3">
-            <a:extLst>
-              <a:ext uri="{28A0092B-C50C-407E-A947-70E740481C1C}">
-                <a14:useLocalDpi xmlns:a14="http://schemas.microsoft.com/office/drawing/2010/main" val="0"/>
-              </a:ext>
-            </a:extLst>
-          </a:blip>
-          <a:srcRect l="11572" t="11168" r="8328" b="11250"/>
-          <a:stretch/>
-        </p:blipFill>
+      <p:sp>
+        <p:nvSpPr>
+          <p:cNvPr id="2" name="Titre 1">
+            <a:extLst>
+              <a:ext uri="{FF2B5EF4-FFF2-40B4-BE49-F238E27FC236}">
+                <a16:creationId xmlns:a16="http://schemas.microsoft.com/office/drawing/2014/main" id="{465F4E1D-C2D1-48A3-87E1-EAA86D29F741}"/>
+              </a:ext>
+            </a:extLst>
+          </p:cNvPr>
+          <p:cNvSpPr>
+            <a:spLocks noGrp="1"/>
+          </p:cNvSpPr>
+          <p:nvPr>
+            <p:ph type="ctrTitle"/>
+          </p:nvPr>
+        </p:nvSpPr>
         <p:spPr>
           <a:xfrm>
-            <a:off x="430219" y="989700"/>
-            <a:ext cx="5334730" cy="4428805"/>
+            <a:off x="1391920" y="396240"/>
+            <a:ext cx="9408160" cy="1046481"/>
           </a:xfrm>
-          <a:prstGeom prst="rect">
-            <a:avLst/>
-          </a:prstGeom>
         </p:spPr>
-      </p:pic>
-      <p:pic>
-        <p:nvPicPr>
-          <p:cNvPr id="8" name="Image 7">
-            <a:extLst>
-              <a:ext uri="{FF2B5EF4-FFF2-40B4-BE49-F238E27FC236}">
-                <a16:creationId xmlns:a16="http://schemas.microsoft.com/office/drawing/2014/main" id="{C6DE29A2-8005-4387-954F-8694383DCEC4}"/>
-              </a:ext>
-            </a:extLst>
-          </p:cNvPr>
-          <p:cNvPicPr>
-            <a:picLocks noChangeAspect="1"/>
-          </p:cNvPicPr>
-          <p:nvPr/>
-        </p:nvPicPr>
-        <p:blipFill rotWithShape="1">
-          <a:blip r:embed="rId4">
-            <a:extLst>
-              <a:ext uri="{28A0092B-C50C-407E-A947-70E740481C1C}">
-                <a14:useLocalDpi xmlns:a14="http://schemas.microsoft.com/office/drawing/2010/main" val="0"/>
-              </a:ext>
-            </a:extLst>
-          </a:blip>
-          <a:srcRect l="11976" t="11800" r="8925" b="11390"/>
-          <a:stretch/>
-        </p:blipFill>
-        <p:spPr>
-          <a:xfrm>
-            <a:off x="6427052" y="995293"/>
-            <a:ext cx="5334729" cy="4440307"/>
-          </a:xfrm>
-          <a:prstGeom prst="rect">
-            <a:avLst/>
-          </a:prstGeom>
-        </p:spPr>
-      </p:pic>
+        <p:txBody>
+          <a:bodyPr>
+            <a:normAutofit/>
+          </a:bodyPr>
+          <a:lstStyle/>
+          <a:p>
+            <a:r>
+              <a:rPr lang="fr-FR" dirty="0"/>
+              <a:t>Matrice de confusion</a:t>
+            </a:r>
+          </a:p>
+        </p:txBody>
+      </p:sp>
       <p:pic>
         <p:nvPicPr>
           <p:cNvPr id="4" name="Image 3">
@@ -9237,7 +9740,7 @@
           <p:nvPr/>
         </p:nvPicPr>
         <p:blipFill>
-          <a:blip r:embed="rId5">
+          <a:blip r:embed="rId3">
             <a:extLst>
               <a:ext uri="{28A0092B-C50C-407E-A947-70E740481C1C}">
                 <a14:useLocalDpi xmlns:a14="http://schemas.microsoft.com/office/drawing/2010/main" val="0"/>
@@ -9260,10 +9763,10 @@
       </p:pic>
       <p:sp>
         <p:nvSpPr>
-          <p:cNvPr id="9" name="ZoneTexte 8">
-            <a:extLst>
-              <a:ext uri="{FF2B5EF4-FFF2-40B4-BE49-F238E27FC236}">
-                <a16:creationId xmlns:a16="http://schemas.microsoft.com/office/drawing/2014/main" id="{46B82DD5-9E38-4800-B3CD-C8D7BEFB7172}"/>
+          <p:cNvPr id="7" name="ZoneTexte 6">
+            <a:extLst>
+              <a:ext uri="{FF2B5EF4-FFF2-40B4-BE49-F238E27FC236}">
+                <a16:creationId xmlns:a16="http://schemas.microsoft.com/office/drawing/2014/main" id="{3CACB3D4-FFFC-4B81-9438-E3FBA4E0BDDD}"/>
               </a:ext>
             </a:extLst>
           </p:cNvPr>
@@ -9272,8 +9775,8 @@
         </p:nvSpPr>
         <p:spPr>
           <a:xfrm>
-            <a:off x="2543586" y="460170"/>
-            <a:ext cx="1107996" cy="369332"/>
+            <a:off x="4666761" y="6092428"/>
+            <a:ext cx="2858475" cy="369332"/>
           </a:xfrm>
           <a:prstGeom prst="rect">
             <a:avLst/>
@@ -9290,67 +9793,164 @@
               <a:rPr lang="fr-FR" altLang="fr-FR" dirty="0">
                 <a:latin typeface="Arial Unicode MS"/>
               </a:rPr>
-              <a:t>K-</a:t>
+              <a:t>L'</a:t>
             </a:r>
             <a:r>
               <a:rPr lang="fr-FR" altLang="fr-FR" dirty="0" err="1">
                 <a:latin typeface="Arial Unicode MS"/>
               </a:rPr>
-              <a:t>means</a:t>
-            </a:r>
-            <a:endParaRPr lang="fr-FR" altLang="fr-FR" dirty="0">
-              <a:latin typeface="Arial Unicode MS"/>
-            </a:endParaRPr>
-          </a:p>
-        </p:txBody>
-      </p:sp>
-      <p:sp>
-        <p:nvSpPr>
-          <p:cNvPr id="10" name="ZoneTexte 9">
-            <a:extLst>
-              <a:ext uri="{FF2B5EF4-FFF2-40B4-BE49-F238E27FC236}">
-                <a16:creationId xmlns:a16="http://schemas.microsoft.com/office/drawing/2014/main" id="{6F947EA3-9AA7-4241-9853-38DBAF254C9B}"/>
-              </a:ext>
-            </a:extLst>
-          </p:cNvPr>
-          <p:cNvSpPr txBox="1"/>
+              <a:t>accuracy</a:t>
+            </a:r>
+            <a:r>
+              <a:rPr lang="fr-FR" altLang="fr-FR" dirty="0">
+                <a:latin typeface="Arial Unicode MS"/>
+              </a:rPr>
+              <a:t> est de : 95.0</a:t>
+            </a:r>
+            <a:r>
+              <a:rPr kumimoji="0" lang="fr-FR" altLang="fr-FR" sz="1400" b="0" i="0" u="none" strike="noStrike" cap="none" normalizeH="0" baseline="0" dirty="0">
+                <a:ln>
+                  <a:noFill/>
+                </a:ln>
+                <a:solidFill>
+                  <a:schemeClr val="tx1"/>
+                </a:solidFill>
+                <a:effectLst/>
+              </a:rPr>
+              <a:t> </a:t>
+            </a:r>
+            <a:r>
+              <a:rPr lang="fr-FR" altLang="fr-FR" dirty="0">
+                <a:latin typeface="Arial Unicode MS"/>
+              </a:rPr>
+              <a:t>%</a:t>
+            </a:r>
+          </a:p>
+        </p:txBody>
+      </p:sp>
+      <p:pic>
+        <p:nvPicPr>
+          <p:cNvPr id="6" name="Image 5">
+            <a:extLst>
+              <a:ext uri="{FF2B5EF4-FFF2-40B4-BE49-F238E27FC236}">
+                <a16:creationId xmlns:a16="http://schemas.microsoft.com/office/drawing/2014/main" id="{FF7A83EE-0F44-4876-9C2C-7D8EFA3B9C5A}"/>
+              </a:ext>
+            </a:extLst>
+          </p:cNvPr>
+          <p:cNvPicPr>
+            <a:picLocks noChangeAspect="1"/>
+          </p:cNvPicPr>
           <p:nvPr/>
-        </p:nvSpPr>
+        </p:nvPicPr>
+        <p:blipFill rotWithShape="1">
+          <a:blip r:embed="rId4">
+            <a:extLst>
+              <a:ext uri="{28A0092B-C50C-407E-A947-70E740481C1C}">
+                <a14:useLocalDpi xmlns:a14="http://schemas.microsoft.com/office/drawing/2010/main" val="0"/>
+              </a:ext>
+            </a:extLst>
+          </a:blip>
+          <a:srcRect l="3666" r="11711"/>
+          <a:stretch/>
+        </p:blipFill>
         <p:spPr>
           <a:xfrm>
-            <a:off x="8764838" y="460170"/>
-            <a:ext cx="659155" cy="369332"/>
+            <a:off x="3290453" y="1557358"/>
+            <a:ext cx="5611090" cy="4420433"/>
           </a:xfrm>
           <a:prstGeom prst="rect">
             <a:avLst/>
           </a:prstGeom>
-          <a:noFill/>
         </p:spPr>
-        <p:txBody>
-          <a:bodyPr wrap="none" rtlCol="0">
-            <a:spAutoFit/>
-          </a:bodyPr>
-          <a:lstStyle/>
-          <a:p>
-            <a:r>
-              <a:rPr lang="fr-FR" altLang="fr-FR" dirty="0">
-                <a:latin typeface="Arial Unicode MS"/>
-              </a:rPr>
-              <a:t>ACP</a:t>
-            </a:r>
-          </a:p>
-        </p:txBody>
-      </p:sp>
+      </p:pic>
     </p:spTree>
     <p:extLst>
       <p:ext uri="{BB962C8B-B14F-4D97-AF65-F5344CB8AC3E}">
-        <p14:creationId xmlns:p14="http://schemas.microsoft.com/office/powerpoint/2010/main" val="2966757290"/>
+        <p14:creationId xmlns:p14="http://schemas.microsoft.com/office/powerpoint/2010/main" val="3098862034"/>
       </p:ext>
     </p:extLst>
   </p:cSld>
   <p:clrMapOvr>
     <a:masterClrMapping/>
   </p:clrMapOvr>
+  <p:timing>
+    <p:tnLst>
+      <p:par>
+        <p:cTn id="1" dur="indefinite" restart="never" nodeType="tmRoot">
+          <p:childTnLst>
+            <p:seq concurrent="1" nextAc="seek">
+              <p:cTn id="2" dur="indefinite" nodeType="mainSeq">
+                <p:childTnLst>
+                  <p:par>
+                    <p:cTn id="3" fill="hold">
+                      <p:stCondLst>
+                        <p:cond delay="indefinite"/>
+                      </p:stCondLst>
+                      <p:childTnLst>
+                        <p:par>
+                          <p:cTn id="4" fill="hold">
+                            <p:stCondLst>
+                              <p:cond delay="0"/>
+                            </p:stCondLst>
+                            <p:childTnLst>
+                              <p:par>
+                                <p:cTn id="5" presetID="1" presetClass="entr" presetSubtype="0" fill="hold" grpId="0" nodeType="clickEffect">
+                                  <p:stCondLst>
+                                    <p:cond delay="0"/>
+                                  </p:stCondLst>
+                                  <p:childTnLst>
+                                    <p:set>
+                                      <p:cBhvr>
+                                        <p:cTn id="6" dur="1" fill="hold">
+                                          <p:stCondLst>
+                                            <p:cond delay="0"/>
+                                          </p:stCondLst>
+                                        </p:cTn>
+                                        <p:tgtEl>
+                                          <p:spTgt spid="7"/>
+                                        </p:tgtEl>
+                                        <p:attrNameLst>
+                                          <p:attrName>style.visibility</p:attrName>
+                                        </p:attrNameLst>
+                                      </p:cBhvr>
+                                      <p:to>
+                                        <p:strVal val="visible"/>
+                                      </p:to>
+                                    </p:set>
+                                  </p:childTnLst>
+                                </p:cTn>
+                              </p:par>
+                            </p:childTnLst>
+                          </p:cTn>
+                        </p:par>
+                      </p:childTnLst>
+                    </p:cTn>
+                  </p:par>
+                </p:childTnLst>
+              </p:cTn>
+              <p:prevCondLst>
+                <p:cond evt="onPrev" delay="0">
+                  <p:tgtEl>
+                    <p:sldTgt/>
+                  </p:tgtEl>
+                </p:cond>
+              </p:prevCondLst>
+              <p:nextCondLst>
+                <p:cond evt="onNext" delay="0">
+                  <p:tgtEl>
+                    <p:sldTgt/>
+                  </p:tgtEl>
+                </p:cond>
+              </p:nextCondLst>
+            </p:seq>
+          </p:childTnLst>
+        </p:cTn>
+      </p:par>
+    </p:tnLst>
+    <p:bldLst>
+      <p:bldP spid="7" grpId="0"/>
+    </p:bldLst>
+  </p:timing>
 </p:sld>
 </file>
 
@@ -10113,204 +10713,6 @@
 <file path=ppt/slides/slide20.xml><?xml version="1.0" encoding="utf-8"?>
 <p:sld xmlns:a="http://schemas.openxmlformats.org/drawingml/2006/main" xmlns:r="http://schemas.openxmlformats.org/officeDocument/2006/relationships" xmlns:p="http://schemas.openxmlformats.org/presentationml/2006/main">
   <p:cSld>
-    <p:spTree>
-      <p:nvGrpSpPr>
-        <p:cNvPr id="1" name=""/>
-        <p:cNvGrpSpPr/>
-        <p:nvPr/>
-      </p:nvGrpSpPr>
-      <p:grpSpPr>
-        <a:xfrm>
-          <a:off x="0" y="0"/>
-          <a:ext cx="0" cy="0"/>
-          <a:chOff x="0" y="0"/>
-          <a:chExt cx="0" cy="0"/>
-        </a:xfrm>
-      </p:grpSpPr>
-      <p:sp>
-        <p:nvSpPr>
-          <p:cNvPr id="2" name="Titre 1">
-            <a:extLst>
-              <a:ext uri="{FF2B5EF4-FFF2-40B4-BE49-F238E27FC236}">
-                <a16:creationId xmlns:a16="http://schemas.microsoft.com/office/drawing/2014/main" id="{465F4E1D-C2D1-48A3-87E1-EAA86D29F741}"/>
-              </a:ext>
-            </a:extLst>
-          </p:cNvPr>
-          <p:cNvSpPr>
-            <a:spLocks noGrp="1"/>
-          </p:cNvSpPr>
-          <p:nvPr>
-            <p:ph type="ctrTitle"/>
-          </p:nvPr>
-        </p:nvSpPr>
-        <p:spPr>
-          <a:xfrm>
-            <a:off x="1391920" y="396240"/>
-            <a:ext cx="9408160" cy="1046481"/>
-          </a:xfrm>
-        </p:spPr>
-        <p:txBody>
-          <a:bodyPr>
-            <a:normAutofit/>
-          </a:bodyPr>
-          <a:lstStyle/>
-          <a:p>
-            <a:r>
-              <a:rPr lang="fr-FR" dirty="0"/>
-              <a:t>Matrice de confusion</a:t>
-            </a:r>
-          </a:p>
-        </p:txBody>
-      </p:sp>
-      <p:pic>
-        <p:nvPicPr>
-          <p:cNvPr id="4" name="Image 3">
-            <a:extLst>
-              <a:ext uri="{FF2B5EF4-FFF2-40B4-BE49-F238E27FC236}">
-                <a16:creationId xmlns:a16="http://schemas.microsoft.com/office/drawing/2014/main" id="{6D19BF79-1D71-48C5-80A2-A1D39A8C2714}"/>
-              </a:ext>
-            </a:extLst>
-          </p:cNvPr>
-          <p:cNvPicPr>
-            <a:picLocks noChangeAspect="1"/>
-          </p:cNvPicPr>
-          <p:nvPr/>
-        </p:nvPicPr>
-        <p:blipFill>
-          <a:blip r:embed="rId3">
-            <a:extLst>
-              <a:ext uri="{28A0092B-C50C-407E-A947-70E740481C1C}">
-                <a14:useLocalDpi xmlns:a14="http://schemas.microsoft.com/office/drawing/2010/main" val="0"/>
-              </a:ext>
-            </a:extLst>
-          </a:blip>
-          <a:stretch>
-            <a:fillRect/>
-          </a:stretch>
-        </p:blipFill>
-        <p:spPr>
-          <a:xfrm>
-            <a:off x="10769600" y="5435600"/>
-            <a:ext cx="1422400" cy="1422400"/>
-          </a:xfrm>
-          <a:prstGeom prst="rect">
-            <a:avLst/>
-          </a:prstGeom>
-        </p:spPr>
-      </p:pic>
-      <p:pic>
-        <p:nvPicPr>
-          <p:cNvPr id="3" name="Image 2">
-            <a:extLst>
-              <a:ext uri="{FF2B5EF4-FFF2-40B4-BE49-F238E27FC236}">
-                <a16:creationId xmlns:a16="http://schemas.microsoft.com/office/drawing/2014/main" id="{EBB6C5F3-6928-4779-BACA-AC6B0B368A3C}"/>
-              </a:ext>
-            </a:extLst>
-          </p:cNvPr>
-          <p:cNvPicPr>
-            <a:picLocks noChangeAspect="1"/>
-          </p:cNvPicPr>
-          <p:nvPr/>
-        </p:nvPicPr>
-        <p:blipFill>
-          <a:blip r:embed="rId4"/>
-          <a:stretch>
-            <a:fillRect/>
-          </a:stretch>
-        </p:blipFill>
-        <p:spPr>
-          <a:xfrm>
-            <a:off x="4365264" y="2374988"/>
-            <a:ext cx="3461471" cy="1054012"/>
-          </a:xfrm>
-          <a:prstGeom prst="rect">
-            <a:avLst/>
-          </a:prstGeom>
-        </p:spPr>
-      </p:pic>
-      <p:sp>
-        <p:nvSpPr>
-          <p:cNvPr id="7" name="ZoneTexte 6">
-            <a:extLst>
-              <a:ext uri="{FF2B5EF4-FFF2-40B4-BE49-F238E27FC236}">
-                <a16:creationId xmlns:a16="http://schemas.microsoft.com/office/drawing/2014/main" id="{3CACB3D4-FFFC-4B81-9438-E3FBA4E0BDDD}"/>
-              </a:ext>
-            </a:extLst>
-          </p:cNvPr>
-          <p:cNvSpPr txBox="1"/>
-          <p:nvPr/>
-        </p:nvSpPr>
-        <p:spPr>
-          <a:xfrm>
-            <a:off x="4666761" y="4509655"/>
-            <a:ext cx="2858475" cy="369332"/>
-          </a:xfrm>
-          <a:prstGeom prst="rect">
-            <a:avLst/>
-          </a:prstGeom>
-          <a:noFill/>
-        </p:spPr>
-        <p:txBody>
-          <a:bodyPr wrap="none" rtlCol="0">
-            <a:spAutoFit/>
-          </a:bodyPr>
-          <a:lstStyle/>
-          <a:p>
-            <a:r>
-              <a:rPr lang="fr-FR" altLang="fr-FR" dirty="0">
-                <a:latin typeface="Arial Unicode MS"/>
-              </a:rPr>
-              <a:t>L'</a:t>
-            </a:r>
-            <a:r>
-              <a:rPr lang="fr-FR" altLang="fr-FR" dirty="0" err="1">
-                <a:latin typeface="Arial Unicode MS"/>
-              </a:rPr>
-              <a:t>accuracy</a:t>
-            </a:r>
-            <a:r>
-              <a:rPr lang="fr-FR" altLang="fr-FR" dirty="0">
-                <a:latin typeface="Arial Unicode MS"/>
-              </a:rPr>
-              <a:t> est de : 95.0</a:t>
-            </a:r>
-            <a:r>
-              <a:rPr kumimoji="0" lang="fr-FR" altLang="fr-FR" sz="1400" b="0" i="0" u="none" strike="noStrike" cap="none" normalizeH="0" baseline="0" dirty="0">
-                <a:ln>
-                  <a:noFill/>
-                </a:ln>
-                <a:solidFill>
-                  <a:schemeClr val="tx1"/>
-                </a:solidFill>
-                <a:effectLst/>
-              </a:rPr>
-              <a:t> </a:t>
-            </a:r>
-            <a:r>
-              <a:rPr lang="fr-FR" altLang="fr-FR" dirty="0">
-                <a:latin typeface="Arial Unicode MS"/>
-              </a:rPr>
-              <a:t>%</a:t>
-            </a:r>
-          </a:p>
-        </p:txBody>
-      </p:sp>
-    </p:spTree>
-    <p:extLst>
-      <p:ext uri="{BB962C8B-B14F-4D97-AF65-F5344CB8AC3E}">
-        <p14:creationId xmlns:p14="http://schemas.microsoft.com/office/powerpoint/2010/main" val="3098862034"/>
-      </p:ext>
-    </p:extLst>
-  </p:cSld>
-  <p:clrMapOvr>
-    <a:masterClrMapping/>
-  </p:clrMapOvr>
-</p:sld>
-</file>
-
-<file path=ppt/slides/slide21.xml><?xml version="1.0" encoding="utf-8"?>
-<p:sld xmlns:a="http://schemas.openxmlformats.org/drawingml/2006/main" xmlns:r="http://schemas.openxmlformats.org/officeDocument/2006/relationships" xmlns:p="http://schemas.openxmlformats.org/presentationml/2006/main">
-  <p:cSld>
     <p:bg>
       <p:bgPr>
         <a:solidFill>
@@ -10830,7 +11232,7 @@
 </p:sld>
 </file>
 
-<file path=ppt/slides/slide22.xml><?xml version="1.0" encoding="utf-8"?>
+<file path=ppt/slides/slide21.xml><?xml version="1.0" encoding="utf-8"?>
 <p:sld xmlns:a="http://schemas.openxmlformats.org/drawingml/2006/main" xmlns:r="http://schemas.openxmlformats.org/officeDocument/2006/relationships" xmlns:p="http://schemas.openxmlformats.org/presentationml/2006/main">
   <p:cSld>
     <p:spTree>
@@ -10961,7 +11363,7 @@
 </p:sld>
 </file>
 
-<file path=ppt/slides/slide23.xml><?xml version="1.0" encoding="utf-8"?>
+<file path=ppt/slides/slide22.xml><?xml version="1.0" encoding="utf-8"?>
 <p:sld xmlns:a="http://schemas.openxmlformats.org/drawingml/2006/main" xmlns:r="http://schemas.openxmlformats.org/officeDocument/2006/relationships" xmlns:p="http://schemas.openxmlformats.org/presentationml/2006/main">
   <p:cSld>
     <p:spTree>
@@ -11418,7 +11820,7 @@
 </p:sld>
 </file>
 
-<file path=ppt/slides/slide24.xml><?xml version="1.0" encoding="utf-8"?>
+<file path=ppt/slides/slide23.xml><?xml version="1.0" encoding="utf-8"?>
 <p:sld xmlns:a="http://schemas.openxmlformats.org/drawingml/2006/main" xmlns:r="http://schemas.openxmlformats.org/officeDocument/2006/relationships" xmlns:p="http://schemas.openxmlformats.org/presentationml/2006/main">
   <p:cSld>
     <p:spTree>
@@ -11875,7 +12277,7 @@
 </p:sld>
 </file>
 
-<file path=ppt/slides/slide25.xml><?xml version="1.0" encoding="utf-8"?>
+<file path=ppt/slides/slide24.xml><?xml version="1.0" encoding="utf-8"?>
 <p:sld xmlns:a="http://schemas.openxmlformats.org/drawingml/2006/main" xmlns:r="http://schemas.openxmlformats.org/officeDocument/2006/relationships" xmlns:p="http://schemas.openxmlformats.org/presentationml/2006/main">
   <p:cSld>
     <p:spTree>
@@ -12425,6 +12827,254 @@
       <p:bldP spid="12" grpId="0" animBg="1"/>
       <p:bldP spid="13" grpId="0" animBg="1"/>
       <p:bldP spid="14" grpId="0" animBg="1"/>
+    </p:bldLst>
+  </p:timing>
+</p:sld>
+</file>
+
+<file path=ppt/slides/slide25.xml><?xml version="1.0" encoding="utf-8"?>
+<p:sld xmlns:a="http://schemas.openxmlformats.org/drawingml/2006/main" xmlns:r="http://schemas.openxmlformats.org/officeDocument/2006/relationships" xmlns:p="http://schemas.openxmlformats.org/presentationml/2006/main">
+  <p:cSld>
+    <p:spTree>
+      <p:nvGrpSpPr>
+        <p:cNvPr id="1" name=""/>
+        <p:cNvGrpSpPr/>
+        <p:nvPr/>
+      </p:nvGrpSpPr>
+      <p:grpSpPr>
+        <a:xfrm>
+          <a:off x="0" y="0"/>
+          <a:ext cx="0" cy="0"/>
+          <a:chOff x="0" y="0"/>
+          <a:chExt cx="0" cy="0"/>
+        </a:xfrm>
+      </p:grpSpPr>
+      <p:sp>
+        <p:nvSpPr>
+          <p:cNvPr id="2" name="Titre 1">
+            <a:extLst>
+              <a:ext uri="{FF2B5EF4-FFF2-40B4-BE49-F238E27FC236}">
+                <a16:creationId xmlns:a16="http://schemas.microsoft.com/office/drawing/2014/main" id="{3830829D-F9D0-4CF2-B5A7-441B5DA96EE2}"/>
+              </a:ext>
+            </a:extLst>
+          </p:cNvPr>
+          <p:cNvSpPr>
+            <a:spLocks noGrp="1"/>
+          </p:cNvSpPr>
+          <p:nvPr>
+            <p:ph type="title"/>
+          </p:nvPr>
+        </p:nvSpPr>
+        <p:spPr/>
+        <p:txBody>
+          <a:bodyPr/>
+          <a:lstStyle/>
+          <a:p>
+            <a:pPr algn="ctr"/>
+            <a:r>
+              <a:rPr lang="fr-FR" sz="6000" dirty="0"/>
+              <a:t>Matrice</a:t>
+            </a:r>
+            <a:r>
+              <a:rPr lang="fr-FR" dirty="0"/>
+              <a:t> </a:t>
+            </a:r>
+            <a:r>
+              <a:rPr lang="fr-FR" sz="6000" dirty="0"/>
+              <a:t>de confusion</a:t>
+            </a:r>
+            <a:endParaRPr lang="fr-FR" dirty="0"/>
+          </a:p>
+        </p:txBody>
+      </p:sp>
+      <p:pic>
+        <p:nvPicPr>
+          <p:cNvPr id="5" name="Image 4">
+            <a:extLst>
+              <a:ext uri="{FF2B5EF4-FFF2-40B4-BE49-F238E27FC236}">
+                <a16:creationId xmlns:a16="http://schemas.microsoft.com/office/drawing/2014/main" id="{999CA5C9-FCC6-4C67-AE5E-476BB716ADDC}"/>
+              </a:ext>
+            </a:extLst>
+          </p:cNvPr>
+          <p:cNvPicPr>
+            <a:picLocks noChangeAspect="1"/>
+          </p:cNvPicPr>
+          <p:nvPr/>
+        </p:nvPicPr>
+        <p:blipFill rotWithShape="1">
+          <a:blip r:embed="rId3">
+            <a:extLst>
+              <a:ext uri="{28A0092B-C50C-407E-A947-70E740481C1C}">
+                <a14:useLocalDpi xmlns:a14="http://schemas.microsoft.com/office/drawing/2010/main" val="0"/>
+              </a:ext>
+            </a:extLst>
+          </a:blip>
+          <a:srcRect l="3861" r="13203"/>
+          <a:stretch/>
+        </p:blipFill>
+        <p:spPr>
+          <a:xfrm>
+            <a:off x="3243695" y="1381574"/>
+            <a:ext cx="5704609" cy="4585570"/>
+          </a:xfrm>
+          <a:prstGeom prst="rect">
+            <a:avLst/>
+          </a:prstGeom>
+        </p:spPr>
+      </p:pic>
+      <p:sp>
+        <p:nvSpPr>
+          <p:cNvPr id="6" name="ZoneTexte 5">
+            <a:extLst>
+              <a:ext uri="{FF2B5EF4-FFF2-40B4-BE49-F238E27FC236}">
+                <a16:creationId xmlns:a16="http://schemas.microsoft.com/office/drawing/2014/main" id="{F517869C-89B4-4120-B8A7-13DB5042B071}"/>
+              </a:ext>
+            </a:extLst>
+          </p:cNvPr>
+          <p:cNvSpPr txBox="1"/>
+          <p:nvPr/>
+        </p:nvSpPr>
+        <p:spPr>
+          <a:xfrm>
+            <a:off x="4666761" y="6092428"/>
+            <a:ext cx="2858475" cy="369332"/>
+          </a:xfrm>
+          <a:prstGeom prst="rect">
+            <a:avLst/>
+          </a:prstGeom>
+          <a:noFill/>
+        </p:spPr>
+        <p:txBody>
+          <a:bodyPr wrap="none" rtlCol="0">
+            <a:spAutoFit/>
+          </a:bodyPr>
+          <a:lstStyle/>
+          <a:p>
+            <a:r>
+              <a:rPr lang="fr-FR" altLang="fr-FR" dirty="0">
+                <a:latin typeface="Arial Unicode MS"/>
+              </a:rPr>
+              <a:t>L'</a:t>
+            </a:r>
+            <a:r>
+              <a:rPr lang="fr-FR" altLang="fr-FR" dirty="0" err="1">
+                <a:latin typeface="Arial Unicode MS"/>
+              </a:rPr>
+              <a:t>accuracy</a:t>
+            </a:r>
+            <a:r>
+              <a:rPr lang="fr-FR" altLang="fr-FR" dirty="0">
+                <a:latin typeface="Arial Unicode MS"/>
+              </a:rPr>
+              <a:t> est de : 98.0</a:t>
+            </a:r>
+            <a:r>
+              <a:rPr kumimoji="0" lang="fr-FR" altLang="fr-FR" sz="1400" b="0" i="0" u="none" strike="noStrike" cap="none" normalizeH="0" baseline="0" dirty="0">
+                <a:ln>
+                  <a:noFill/>
+                </a:ln>
+                <a:solidFill>
+                  <a:schemeClr val="tx1"/>
+                </a:solidFill>
+                <a:effectLst/>
+              </a:rPr>
+              <a:t> </a:t>
+            </a:r>
+            <a:r>
+              <a:rPr lang="fr-FR" altLang="fr-FR" dirty="0">
+                <a:latin typeface="Arial Unicode MS"/>
+              </a:rPr>
+              <a:t>%</a:t>
+            </a:r>
+          </a:p>
+        </p:txBody>
+      </p:sp>
+    </p:spTree>
+    <p:extLst>
+      <p:ext uri="{BB962C8B-B14F-4D97-AF65-F5344CB8AC3E}">
+        <p14:creationId xmlns:p14="http://schemas.microsoft.com/office/powerpoint/2010/main" val="2002164569"/>
+      </p:ext>
+    </p:extLst>
+  </p:cSld>
+  <p:clrMapOvr>
+    <a:masterClrMapping/>
+  </p:clrMapOvr>
+  <p:timing>
+    <p:tnLst>
+      <p:par>
+        <p:cTn id="1" dur="indefinite" restart="never" nodeType="tmRoot">
+          <p:childTnLst>
+            <p:seq concurrent="1" nextAc="seek">
+              <p:cTn id="2" dur="indefinite" nodeType="mainSeq">
+                <p:childTnLst>
+                  <p:par>
+                    <p:cTn id="3" fill="hold">
+                      <p:stCondLst>
+                        <p:cond delay="indefinite"/>
+                      </p:stCondLst>
+                      <p:childTnLst>
+                        <p:par>
+                          <p:cTn id="4" fill="hold">
+                            <p:stCondLst>
+                              <p:cond delay="0"/>
+                            </p:stCondLst>
+                            <p:childTnLst>
+                              <p:par>
+                                <p:cTn id="5" presetID="1" presetClass="entr" presetSubtype="0" fill="hold" grpId="0" nodeType="clickEffect">
+                                  <p:stCondLst>
+                                    <p:cond delay="0"/>
+                                  </p:stCondLst>
+                                  <p:childTnLst>
+                                    <p:set>
+                                      <p:cBhvr>
+                                        <p:cTn id="6" dur="1" fill="hold">
+                                          <p:stCondLst>
+                                            <p:cond delay="0"/>
+                                          </p:stCondLst>
+                                        </p:cTn>
+                                        <p:tgtEl>
+                                          <p:spTgt spid="6"/>
+                                        </p:tgtEl>
+                                        <p:attrNameLst>
+                                          <p:attrName>style.visibility</p:attrName>
+                                        </p:attrNameLst>
+                                      </p:cBhvr>
+                                      <p:to>
+                                        <p:strVal val="visible"/>
+                                      </p:to>
+                                    </p:set>
+                                  </p:childTnLst>
+                                </p:cTn>
+                              </p:par>
+                            </p:childTnLst>
+                          </p:cTn>
+                        </p:par>
+                      </p:childTnLst>
+                    </p:cTn>
+                  </p:par>
+                </p:childTnLst>
+              </p:cTn>
+              <p:prevCondLst>
+                <p:cond evt="onPrev" delay="0">
+                  <p:tgtEl>
+                    <p:sldTgt/>
+                  </p:tgtEl>
+                </p:cond>
+              </p:prevCondLst>
+              <p:nextCondLst>
+                <p:cond evt="onNext" delay="0">
+                  <p:tgtEl>
+                    <p:sldTgt/>
+                  </p:tgtEl>
+                </p:cond>
+              </p:nextCondLst>
+            </p:seq>
+          </p:childTnLst>
+        </p:cTn>
+      </p:par>
+    </p:tnLst>
+    <p:bldLst>
+      <p:bldP spid="6" grpId="0"/>
     </p:bldLst>
   </p:timing>
 </p:sld>
@@ -15376,6 +16026,214 @@
           </a:p>
         </p:txBody>
       </p:sp>
+      <p:sp>
+        <p:nvSpPr>
+          <p:cNvPr id="5" name="Rectangle 4">
+            <a:extLst>
+              <a:ext uri="{FF2B5EF4-FFF2-40B4-BE49-F238E27FC236}">
+                <a16:creationId xmlns:a16="http://schemas.microsoft.com/office/drawing/2014/main" id="{6F98BF06-D878-4879-9CAD-2EFA81550DF5}"/>
+              </a:ext>
+            </a:extLst>
+          </p:cNvPr>
+          <p:cNvSpPr/>
+          <p:nvPr/>
+        </p:nvSpPr>
+        <p:spPr>
+          <a:xfrm>
+            <a:off x="6452755" y="1963881"/>
+            <a:ext cx="800100" cy="504647"/>
+          </a:xfrm>
+          <a:prstGeom prst="rect">
+            <a:avLst/>
+          </a:prstGeom>
+          <a:noFill/>
+          <a:ln>
+            <a:solidFill>
+              <a:srgbClr val="FF0000"/>
+            </a:solidFill>
+          </a:ln>
+        </p:spPr>
+        <p:style>
+          <a:lnRef idx="2">
+            <a:schemeClr val="accent1">
+              <a:shade val="50000"/>
+            </a:schemeClr>
+          </a:lnRef>
+          <a:fillRef idx="1">
+            <a:schemeClr val="accent1"/>
+          </a:fillRef>
+          <a:effectRef idx="0">
+            <a:schemeClr val="accent1"/>
+          </a:effectRef>
+          <a:fontRef idx="minor">
+            <a:schemeClr val="lt1"/>
+          </a:fontRef>
+        </p:style>
+        <p:txBody>
+          <a:bodyPr rtlCol="0" anchor="ctr"/>
+          <a:lstStyle/>
+          <a:p>
+            <a:pPr algn="ctr"/>
+            <a:endParaRPr lang="fr-FR"/>
+          </a:p>
+        </p:txBody>
+      </p:sp>
+      <p:sp>
+        <p:nvSpPr>
+          <p:cNvPr id="10" name="Rectangle 9">
+            <a:extLst>
+              <a:ext uri="{FF2B5EF4-FFF2-40B4-BE49-F238E27FC236}">
+                <a16:creationId xmlns:a16="http://schemas.microsoft.com/office/drawing/2014/main" id="{68C3CBF1-C4FF-4F36-A6CD-AFD832199518}"/>
+              </a:ext>
+            </a:extLst>
+          </p:cNvPr>
+          <p:cNvSpPr/>
+          <p:nvPr/>
+        </p:nvSpPr>
+        <p:spPr>
+          <a:xfrm>
+            <a:off x="6452755" y="4578402"/>
+            <a:ext cx="800100" cy="500813"/>
+          </a:xfrm>
+          <a:prstGeom prst="rect">
+            <a:avLst/>
+          </a:prstGeom>
+          <a:noFill/>
+          <a:ln>
+            <a:solidFill>
+              <a:srgbClr val="FF0000"/>
+            </a:solidFill>
+          </a:ln>
+        </p:spPr>
+        <p:style>
+          <a:lnRef idx="2">
+            <a:schemeClr val="accent1">
+              <a:shade val="50000"/>
+            </a:schemeClr>
+          </a:lnRef>
+          <a:fillRef idx="1">
+            <a:schemeClr val="accent1"/>
+          </a:fillRef>
+          <a:effectRef idx="0">
+            <a:schemeClr val="accent1"/>
+          </a:effectRef>
+          <a:fontRef idx="minor">
+            <a:schemeClr val="lt1"/>
+          </a:fontRef>
+        </p:style>
+        <p:txBody>
+          <a:bodyPr rtlCol="0" anchor="ctr"/>
+          <a:lstStyle/>
+          <a:p>
+            <a:pPr algn="ctr"/>
+            <a:endParaRPr lang="fr-FR"/>
+          </a:p>
+        </p:txBody>
+      </p:sp>
+      <p:sp>
+        <p:nvSpPr>
+          <p:cNvPr id="13" name="Rectangle 12">
+            <a:extLst>
+              <a:ext uri="{FF2B5EF4-FFF2-40B4-BE49-F238E27FC236}">
+                <a16:creationId xmlns:a16="http://schemas.microsoft.com/office/drawing/2014/main" id="{BF60D4F6-01F2-4E5A-8058-C95D62700CF3}"/>
+              </a:ext>
+            </a:extLst>
+          </p:cNvPr>
+          <p:cNvSpPr/>
+          <p:nvPr/>
+        </p:nvSpPr>
+        <p:spPr>
+          <a:xfrm>
+            <a:off x="8047027" y="1963882"/>
+            <a:ext cx="722900" cy="504646"/>
+          </a:xfrm>
+          <a:prstGeom prst="rect">
+            <a:avLst/>
+          </a:prstGeom>
+          <a:noFill/>
+          <a:ln>
+            <a:solidFill>
+              <a:srgbClr val="FF0000"/>
+            </a:solidFill>
+          </a:ln>
+        </p:spPr>
+        <p:style>
+          <a:lnRef idx="2">
+            <a:schemeClr val="accent1">
+              <a:shade val="50000"/>
+            </a:schemeClr>
+          </a:lnRef>
+          <a:fillRef idx="1">
+            <a:schemeClr val="accent1"/>
+          </a:fillRef>
+          <a:effectRef idx="0">
+            <a:schemeClr val="accent1"/>
+          </a:effectRef>
+          <a:fontRef idx="minor">
+            <a:schemeClr val="lt1"/>
+          </a:fontRef>
+        </p:style>
+        <p:txBody>
+          <a:bodyPr rtlCol="0" anchor="ctr"/>
+          <a:lstStyle/>
+          <a:p>
+            <a:pPr algn="ctr"/>
+            <a:endParaRPr lang="fr-FR"/>
+          </a:p>
+        </p:txBody>
+      </p:sp>
+      <p:sp>
+        <p:nvSpPr>
+          <p:cNvPr id="14" name="Rectangle 13">
+            <a:extLst>
+              <a:ext uri="{FF2B5EF4-FFF2-40B4-BE49-F238E27FC236}">
+                <a16:creationId xmlns:a16="http://schemas.microsoft.com/office/drawing/2014/main" id="{07C50A22-B1BB-49D5-87BE-CDB9C8D6AD46}"/>
+              </a:ext>
+            </a:extLst>
+          </p:cNvPr>
+          <p:cNvSpPr/>
+          <p:nvPr/>
+        </p:nvSpPr>
+        <p:spPr>
+          <a:xfrm>
+            <a:off x="8047027" y="4578403"/>
+            <a:ext cx="722900" cy="500812"/>
+          </a:xfrm>
+          <a:prstGeom prst="rect">
+            <a:avLst/>
+          </a:prstGeom>
+          <a:noFill/>
+          <a:ln>
+            <a:solidFill>
+              <a:srgbClr val="FF0000"/>
+            </a:solidFill>
+          </a:ln>
+        </p:spPr>
+        <p:style>
+          <a:lnRef idx="2">
+            <a:schemeClr val="accent1">
+              <a:shade val="50000"/>
+            </a:schemeClr>
+          </a:lnRef>
+          <a:fillRef idx="1">
+            <a:schemeClr val="accent1"/>
+          </a:fillRef>
+          <a:effectRef idx="0">
+            <a:schemeClr val="accent1"/>
+          </a:effectRef>
+          <a:fontRef idx="minor">
+            <a:schemeClr val="lt1"/>
+          </a:fontRef>
+        </p:style>
+        <p:txBody>
+          <a:bodyPr rtlCol="0" anchor="ctr"/>
+          <a:lstStyle/>
+          <a:p>
+            <a:pPr algn="ctr"/>
+            <a:endParaRPr lang="fr-FR"/>
+          </a:p>
+        </p:txBody>
+      </p:sp>
     </p:spTree>
     <p:extLst>
       <p:ext uri="{BB962C8B-B14F-4D97-AF65-F5344CB8AC3E}">
@@ -15386,6 +16244,186 @@
   <p:clrMapOvr>
     <a:masterClrMapping/>
   </p:clrMapOvr>
+  <p:timing>
+    <p:tnLst>
+      <p:par>
+        <p:cTn id="1" dur="indefinite" restart="never" nodeType="tmRoot">
+          <p:childTnLst>
+            <p:seq concurrent="1" nextAc="seek">
+              <p:cTn id="2" dur="indefinite" nodeType="mainSeq">
+                <p:childTnLst>
+                  <p:par>
+                    <p:cTn id="3" fill="hold">
+                      <p:stCondLst>
+                        <p:cond delay="indefinite"/>
+                      </p:stCondLst>
+                      <p:childTnLst>
+                        <p:par>
+                          <p:cTn id="4" fill="hold">
+                            <p:stCondLst>
+                              <p:cond delay="0"/>
+                            </p:stCondLst>
+                            <p:childTnLst>
+                              <p:par>
+                                <p:cTn id="5" presetID="1" presetClass="entr" presetSubtype="0" fill="hold" grpId="0" nodeType="clickEffect">
+                                  <p:stCondLst>
+                                    <p:cond delay="0"/>
+                                  </p:stCondLst>
+                                  <p:childTnLst>
+                                    <p:set>
+                                      <p:cBhvr>
+                                        <p:cTn id="6" dur="1" fill="hold">
+                                          <p:stCondLst>
+                                            <p:cond delay="0"/>
+                                          </p:stCondLst>
+                                        </p:cTn>
+                                        <p:tgtEl>
+                                          <p:spTgt spid="5"/>
+                                        </p:tgtEl>
+                                        <p:attrNameLst>
+                                          <p:attrName>style.visibility</p:attrName>
+                                        </p:attrNameLst>
+                                      </p:cBhvr>
+                                      <p:to>
+                                        <p:strVal val="visible"/>
+                                      </p:to>
+                                    </p:set>
+                                  </p:childTnLst>
+                                </p:cTn>
+                              </p:par>
+                              <p:par>
+                                <p:cTn id="7" presetID="1" presetClass="entr" presetSubtype="0" fill="hold" grpId="0" nodeType="withEffect">
+                                  <p:stCondLst>
+                                    <p:cond delay="0"/>
+                                  </p:stCondLst>
+                                  <p:childTnLst>
+                                    <p:set>
+                                      <p:cBhvr>
+                                        <p:cTn id="8" dur="1" fill="hold">
+                                          <p:stCondLst>
+                                            <p:cond delay="0"/>
+                                          </p:stCondLst>
+                                        </p:cTn>
+                                        <p:tgtEl>
+                                          <p:spTgt spid="10"/>
+                                        </p:tgtEl>
+                                        <p:attrNameLst>
+                                          <p:attrName>style.visibility</p:attrName>
+                                        </p:attrNameLst>
+                                      </p:cBhvr>
+                                      <p:to>
+                                        <p:strVal val="visible"/>
+                                      </p:to>
+                                    </p:set>
+                                  </p:childTnLst>
+                                </p:cTn>
+                              </p:par>
+                            </p:childTnLst>
+                          </p:cTn>
+                        </p:par>
+                      </p:childTnLst>
+                    </p:cTn>
+                  </p:par>
+                  <p:par>
+                    <p:cTn id="9" fill="hold">
+                      <p:stCondLst>
+                        <p:cond delay="indefinite"/>
+                      </p:stCondLst>
+                      <p:childTnLst>
+                        <p:par>
+                          <p:cTn id="10" fill="hold">
+                            <p:stCondLst>
+                              <p:cond delay="0"/>
+                            </p:stCondLst>
+                            <p:childTnLst>
+                              <p:par>
+                                <p:cTn id="11" presetID="1" presetClass="entr" presetSubtype="0" fill="hold" grpId="0" nodeType="clickEffect">
+                                  <p:stCondLst>
+                                    <p:cond delay="0"/>
+                                  </p:stCondLst>
+                                  <p:childTnLst>
+                                    <p:set>
+                                      <p:cBhvr>
+                                        <p:cTn id="12" dur="1" fill="hold">
+                                          <p:stCondLst>
+                                            <p:cond delay="0"/>
+                                          </p:stCondLst>
+                                        </p:cTn>
+                                        <p:tgtEl>
+                                          <p:spTgt spid="13"/>
+                                        </p:tgtEl>
+                                        <p:attrNameLst>
+                                          <p:attrName>style.visibility</p:attrName>
+                                        </p:attrNameLst>
+                                      </p:cBhvr>
+                                      <p:to>
+                                        <p:strVal val="visible"/>
+                                      </p:to>
+                                    </p:set>
+                                  </p:childTnLst>
+                                </p:cTn>
+                              </p:par>
+                              <p:par>
+                                <p:cTn id="13" presetID="1" presetClass="entr" presetSubtype="0" fill="hold" grpId="0" nodeType="withEffect">
+                                  <p:stCondLst>
+                                    <p:cond delay="0"/>
+                                  </p:stCondLst>
+                                  <p:childTnLst>
+                                    <p:set>
+                                      <p:cBhvr>
+                                        <p:cTn id="14" dur="1" fill="hold">
+                                          <p:stCondLst>
+                                            <p:cond delay="0"/>
+                                          </p:stCondLst>
+                                        </p:cTn>
+                                        <p:tgtEl>
+                                          <p:spTgt spid="14"/>
+                                        </p:tgtEl>
+                                        <p:attrNameLst>
+                                          <p:attrName>style.visibility</p:attrName>
+                                        </p:attrNameLst>
+                                      </p:cBhvr>
+                                      <p:to>
+                                        <p:strVal val="visible"/>
+                                      </p:to>
+                                    </p:set>
+                                  </p:childTnLst>
+                                </p:cTn>
+                              </p:par>
+                            </p:childTnLst>
+                          </p:cTn>
+                        </p:par>
+                      </p:childTnLst>
+                    </p:cTn>
+                  </p:par>
+                </p:childTnLst>
+              </p:cTn>
+              <p:prevCondLst>
+                <p:cond evt="onPrev" delay="0">
+                  <p:tgtEl>
+                    <p:sldTgt/>
+                  </p:tgtEl>
+                </p:cond>
+              </p:prevCondLst>
+              <p:nextCondLst>
+                <p:cond evt="onNext" delay="0">
+                  <p:tgtEl>
+                    <p:sldTgt/>
+                  </p:tgtEl>
+                </p:cond>
+              </p:nextCondLst>
+            </p:seq>
+          </p:childTnLst>
+        </p:cTn>
+      </p:par>
+    </p:tnLst>
+    <p:bldLst>
+      <p:bldP spid="5" grpId="0" animBg="1"/>
+      <p:bldP spid="10" grpId="0" animBg="1"/>
+      <p:bldP spid="13" grpId="0" animBg="1"/>
+      <p:bldP spid="14" grpId="0" animBg="1"/>
+    </p:bldLst>
+  </p:timing>
 </p:sld>
 </file>
 

</xml_diff>